<commit_message>
added demo slide to pp
</commit_message>
<xml_diff>
--- a/Project-3.pptx
+++ b/Project-3.pptx
@@ -5,15 +5,16 @@
     <p:sldMasterId id="2147483648" r:id="rId1"/>
   </p:sldMasterIdLst>
   <p:notesMasterIdLst>
-    <p:notesMasterId r:id="rId8"/>
+    <p:notesMasterId r:id="rId9"/>
   </p:notesMasterIdLst>
   <p:sldIdLst>
     <p:sldId id="256" r:id="rId2"/>
     <p:sldId id="257" r:id="rId3"/>
     <p:sldId id="258" r:id="rId4"/>
-    <p:sldId id="259" r:id="rId5"/>
-    <p:sldId id="260" r:id="rId6"/>
-    <p:sldId id="261" r:id="rId7"/>
+    <p:sldId id="262" r:id="rId5"/>
+    <p:sldId id="259" r:id="rId6"/>
+    <p:sldId id="260" r:id="rId7"/>
+    <p:sldId id="261" r:id="rId8"/>
   </p:sldIdLst>
   <p:sldSz cx="12192000" cy="6858000"/>
   <p:notesSz cx="6858000" cy="9144000"/>
@@ -862,7 +863,7 @@
           <a:p>
             <a:fld id="{97A8A3DF-6C8A-C742-B4C9-A657098D1157}" type="slidenum">
               <a:rPr lang="en-US" smtClean="0"/>
-              <a:t>4</a:t>
+              <a:t>5</a:t>
             </a:fld>
             <a:endParaRPr lang="en-US"/>
           </a:p>
@@ -1065,7 +1066,7 @@
           <a:p>
             <a:fld id="{97A8A3DF-6C8A-C742-B4C9-A657098D1157}" type="slidenum">
               <a:rPr lang="en-US" smtClean="0"/>
-              <a:t>5</a:t>
+              <a:t>6</a:t>
             </a:fld>
             <a:endParaRPr lang="en-US"/>
           </a:p>
@@ -1219,7 +1220,7 @@
           <a:p>
             <a:fld id="{97A8A3DF-6C8A-C742-B4C9-A657098D1157}" type="slidenum">
               <a:rPr lang="en-US" smtClean="0"/>
-              <a:t>6</a:t>
+              <a:t>7</a:t>
             </a:fld>
             <a:endParaRPr lang="en-US"/>
           </a:p>
@@ -9333,7 +9334,7 @@
           <p:cNvPr id="2" name="Title 1">
             <a:extLst>
               <a:ext uri="{FF2B5EF4-FFF2-40B4-BE49-F238E27FC236}">
-                <a16:creationId xmlns:a16="http://schemas.microsoft.com/office/drawing/2014/main" id="{3E68A2FD-7BFB-2042-EEF9-4F63D57A3624}"/>
+                <a16:creationId xmlns:a16="http://schemas.microsoft.com/office/drawing/2014/main" id="{3567C01C-A97B-8618-385F-00886487EE28}"/>
               </a:ext>
             </a:extLst>
           </p:cNvPr>
@@ -9349,10 +9350,7 @@
           <a:bodyPr/>
           <a:lstStyle/>
           <a:p>
-            <a:r>
-              <a:rPr lang="en-US" dirty="0"/>
-              <a:t>Methods-jQuery over d3.js</a:t>
-            </a:r>
+            <a:endParaRPr lang="en-US" dirty="0"/>
           </a:p>
         </p:txBody>
       </p:sp>
@@ -9361,7 +9359,7 @@
           <p:cNvPr id="3" name="Content Placeholder 2">
             <a:extLst>
               <a:ext uri="{FF2B5EF4-FFF2-40B4-BE49-F238E27FC236}">
-                <a16:creationId xmlns:a16="http://schemas.microsoft.com/office/drawing/2014/main" id="{3C1E3288-7F5F-448F-3C62-9E661D62237F}"/>
+                <a16:creationId xmlns:a16="http://schemas.microsoft.com/office/drawing/2014/main" id="{CD0B13C4-4683-D6D9-3885-E11F24A96C20}"/>
               </a:ext>
             </a:extLst>
           </p:cNvPr>
@@ -9372,86 +9370,27 @@
             <p:ph idx="1"/>
           </p:nvPr>
         </p:nvSpPr>
-        <p:spPr>
-          <a:xfrm>
-            <a:off x="680321" y="2336872"/>
-            <a:ext cx="5956453" cy="4317795"/>
-          </a:xfrm>
-        </p:spPr>
-        <p:txBody>
-          <a:bodyPr/>
+        <p:spPr/>
+        <p:txBody>
+          <a:bodyPr>
+            <a:normAutofit/>
+          </a:bodyPr>
           <a:lstStyle/>
           <a:p>
-            <a:r>
-              <a:rPr lang="en-US" dirty="0"/>
-              <a:t>More specialized</a:t>
-            </a:r>
-          </a:p>
-          <a:p>
-            <a:r>
-              <a:rPr lang="en-US" dirty="0"/>
-              <a:t>More intuitive</a:t>
-            </a:r>
-          </a:p>
-          <a:p>
-            <a:r>
-              <a:rPr lang="en-US" dirty="0"/>
-              <a:t>1/3 the size</a:t>
-            </a:r>
-          </a:p>
-          <a:p>
-            <a:endParaRPr lang="en-US" dirty="0"/>
-          </a:p>
-          <a:p>
-            <a:r>
-              <a:rPr lang="en-US" dirty="0"/>
-              <a:t>With the use of </a:t>
-            </a:r>
-            <a:r>
-              <a:rPr lang="en-US" dirty="0" err="1"/>
-              <a:t>Plotly</a:t>
-            </a:r>
-            <a:r>
-              <a:rPr lang="en-US" dirty="0"/>
-              <a:t> and Leaflet instead of d3 for our visualizations, jQuery becomes the superior choice</a:t>
-            </a:r>
-          </a:p>
-        </p:txBody>
-      </p:sp>
-      <p:pic>
-        <p:nvPicPr>
-          <p:cNvPr id="6" name="Picture 5" descr="A screenshot of a computer code&#10;&#10;Description automatically generated">
-            <a:extLst>
-              <a:ext uri="{FF2B5EF4-FFF2-40B4-BE49-F238E27FC236}">
-                <a16:creationId xmlns:a16="http://schemas.microsoft.com/office/drawing/2014/main" id="{380FE2FF-CB8A-EA42-2582-44F743C60010}"/>
-              </a:ext>
-            </a:extLst>
-          </p:cNvPr>
-          <p:cNvPicPr>
-            <a:picLocks noChangeAspect="1"/>
-          </p:cNvPicPr>
-          <p:nvPr/>
-        </p:nvPicPr>
-        <p:blipFill>
-          <a:blip r:embed="rId3"/>
-          <a:stretch>
-            <a:fillRect/>
-          </a:stretch>
-        </p:blipFill>
-        <p:spPr>
-          <a:xfrm>
-            <a:off x="6651330" y="2336872"/>
-            <a:ext cx="5167671" cy="3835063"/>
-          </a:xfrm>
-          <a:prstGeom prst="rect">
-            <a:avLst/>
-          </a:prstGeom>
-        </p:spPr>
-      </p:pic>
+            <a:pPr marL="0" indent="0" algn="ctr">
+              <a:buNone/>
+            </a:pPr>
+            <a:r>
+              <a:rPr lang="en-US" sz="7200" dirty="0"/>
+              <a:t>Dashboard Demonstration </a:t>
+            </a:r>
+          </a:p>
+        </p:txBody>
+      </p:sp>
     </p:spTree>
     <p:extLst>
       <p:ext uri="{BB962C8B-B14F-4D97-AF65-F5344CB8AC3E}">
-        <p14:creationId xmlns:p14="http://schemas.microsoft.com/office/powerpoint/2010/main" val="1743138572"/>
+        <p14:creationId xmlns:p14="http://schemas.microsoft.com/office/powerpoint/2010/main" val="1481904168"/>
       </p:ext>
     </p:extLst>
   </p:cSld>
@@ -9483,6 +9422,156 @@
           <p:cNvPr id="2" name="Title 1">
             <a:extLst>
               <a:ext uri="{FF2B5EF4-FFF2-40B4-BE49-F238E27FC236}">
+                <a16:creationId xmlns:a16="http://schemas.microsoft.com/office/drawing/2014/main" id="{3E68A2FD-7BFB-2042-EEF9-4F63D57A3624}"/>
+              </a:ext>
+            </a:extLst>
+          </p:cNvPr>
+          <p:cNvSpPr>
+            <a:spLocks noGrp="1"/>
+          </p:cNvSpPr>
+          <p:nvPr>
+            <p:ph type="title"/>
+          </p:nvPr>
+        </p:nvSpPr>
+        <p:spPr/>
+        <p:txBody>
+          <a:bodyPr/>
+          <a:lstStyle/>
+          <a:p>
+            <a:r>
+              <a:rPr lang="en-US" dirty="0"/>
+              <a:t>Methods-jQuery over d3.js</a:t>
+            </a:r>
+          </a:p>
+        </p:txBody>
+      </p:sp>
+      <p:sp>
+        <p:nvSpPr>
+          <p:cNvPr id="3" name="Content Placeholder 2">
+            <a:extLst>
+              <a:ext uri="{FF2B5EF4-FFF2-40B4-BE49-F238E27FC236}">
+                <a16:creationId xmlns:a16="http://schemas.microsoft.com/office/drawing/2014/main" id="{3C1E3288-7F5F-448F-3C62-9E661D62237F}"/>
+              </a:ext>
+            </a:extLst>
+          </p:cNvPr>
+          <p:cNvSpPr>
+            <a:spLocks noGrp="1"/>
+          </p:cNvSpPr>
+          <p:nvPr>
+            <p:ph idx="1"/>
+          </p:nvPr>
+        </p:nvSpPr>
+        <p:spPr>
+          <a:xfrm>
+            <a:off x="680321" y="2336872"/>
+            <a:ext cx="5956453" cy="4317795"/>
+          </a:xfrm>
+        </p:spPr>
+        <p:txBody>
+          <a:bodyPr/>
+          <a:lstStyle/>
+          <a:p>
+            <a:r>
+              <a:rPr lang="en-US" dirty="0"/>
+              <a:t>More specialized</a:t>
+            </a:r>
+          </a:p>
+          <a:p>
+            <a:r>
+              <a:rPr lang="en-US" dirty="0"/>
+              <a:t>More intuitive</a:t>
+            </a:r>
+          </a:p>
+          <a:p>
+            <a:r>
+              <a:rPr lang="en-US" dirty="0"/>
+              <a:t>1/3 the size</a:t>
+            </a:r>
+          </a:p>
+          <a:p>
+            <a:endParaRPr lang="en-US" dirty="0"/>
+          </a:p>
+          <a:p>
+            <a:r>
+              <a:rPr lang="en-US" dirty="0"/>
+              <a:t>With the use of </a:t>
+            </a:r>
+            <a:r>
+              <a:rPr lang="en-US" dirty="0" err="1"/>
+              <a:t>Plotly</a:t>
+            </a:r>
+            <a:r>
+              <a:rPr lang="en-US" dirty="0"/>
+              <a:t> and Leaflet instead of d3 for our visualizations, jQuery becomes the superior choice</a:t>
+            </a:r>
+          </a:p>
+        </p:txBody>
+      </p:sp>
+      <p:pic>
+        <p:nvPicPr>
+          <p:cNvPr id="6" name="Picture 5" descr="A screenshot of a computer code&#10;&#10;Description automatically generated">
+            <a:extLst>
+              <a:ext uri="{FF2B5EF4-FFF2-40B4-BE49-F238E27FC236}">
+                <a16:creationId xmlns:a16="http://schemas.microsoft.com/office/drawing/2014/main" id="{380FE2FF-CB8A-EA42-2582-44F743C60010}"/>
+              </a:ext>
+            </a:extLst>
+          </p:cNvPr>
+          <p:cNvPicPr>
+            <a:picLocks noChangeAspect="1"/>
+          </p:cNvPicPr>
+          <p:nvPr/>
+        </p:nvPicPr>
+        <p:blipFill>
+          <a:blip r:embed="rId3"/>
+          <a:stretch>
+            <a:fillRect/>
+          </a:stretch>
+        </p:blipFill>
+        <p:spPr>
+          <a:xfrm>
+            <a:off x="6651330" y="2336872"/>
+            <a:ext cx="5167671" cy="3835063"/>
+          </a:xfrm>
+          <a:prstGeom prst="rect">
+            <a:avLst/>
+          </a:prstGeom>
+        </p:spPr>
+      </p:pic>
+    </p:spTree>
+    <p:extLst>
+      <p:ext uri="{BB962C8B-B14F-4D97-AF65-F5344CB8AC3E}">
+        <p14:creationId xmlns:p14="http://schemas.microsoft.com/office/powerpoint/2010/main" val="1743138572"/>
+      </p:ext>
+    </p:extLst>
+  </p:cSld>
+  <p:clrMapOvr>
+    <a:masterClrMapping/>
+  </p:clrMapOvr>
+</p:sld>
+</file>
+
+<file path=ppt/slides/slide6.xml><?xml version="1.0" encoding="utf-8"?>
+<p:sld xmlns:a="http://schemas.openxmlformats.org/drawingml/2006/main" xmlns:r="http://schemas.openxmlformats.org/officeDocument/2006/relationships" xmlns:p="http://schemas.openxmlformats.org/presentationml/2006/main">
+  <p:cSld>
+    <p:spTree>
+      <p:nvGrpSpPr>
+        <p:cNvPr id="1" name=""/>
+        <p:cNvGrpSpPr/>
+        <p:nvPr/>
+      </p:nvGrpSpPr>
+      <p:grpSpPr>
+        <a:xfrm>
+          <a:off x="0" y="0"/>
+          <a:ext cx="0" cy="0"/>
+          <a:chOff x="0" y="0"/>
+          <a:chExt cx="0" cy="0"/>
+        </a:xfrm>
+      </p:grpSpPr>
+      <p:sp>
+        <p:nvSpPr>
+          <p:cNvPr id="2" name="Title 1">
+            <a:extLst>
+              <a:ext uri="{FF2B5EF4-FFF2-40B4-BE49-F238E27FC236}">
                 <a16:creationId xmlns:a16="http://schemas.microsoft.com/office/drawing/2014/main" id="{FD874FE4-A80D-AA46-3F87-70C880C8888F}"/>
               </a:ext>
             </a:extLst>
@@ -9598,7 +9687,7 @@
 </p:sld>
 </file>
 
-<file path=ppt/slides/slide6.xml><?xml version="1.0" encoding="utf-8"?>
+<file path=ppt/slides/slide7.xml><?xml version="1.0" encoding="utf-8"?>
 <p:sld xmlns:a="http://schemas.openxmlformats.org/drawingml/2006/main" xmlns:r="http://schemas.openxmlformats.org/officeDocument/2006/relationships" xmlns:p="http://schemas.openxmlformats.org/presentationml/2006/main">
   <p:cSld>
     <p:spTree>

</xml_diff>

<commit_message>
Added conclusion slide to pp
</commit_message>
<xml_diff>
--- a/Project-3.pptx
+++ b/Project-3.pptx
@@ -5,7 +5,7 @@
     <p:sldMasterId id="2147483648" r:id="rId1"/>
   </p:sldMasterIdLst>
   <p:notesMasterIdLst>
-    <p:notesMasterId r:id="rId9"/>
+    <p:notesMasterId r:id="rId10"/>
   </p:notesMasterIdLst>
   <p:sldIdLst>
     <p:sldId id="256" r:id="rId2"/>
@@ -15,6 +15,7 @@
     <p:sldId id="259" r:id="rId6"/>
     <p:sldId id="260" r:id="rId7"/>
     <p:sldId id="261" r:id="rId8"/>
+    <p:sldId id="263" r:id="rId9"/>
   </p:sldIdLst>
   <p:sldSz cx="12192000" cy="6858000"/>
   <p:notesSz cx="6858000" cy="9144000"/>
@@ -1230,6 +1231,102 @@
     <p:extLst>
       <p:ext uri="{BB962C8B-B14F-4D97-AF65-F5344CB8AC3E}">
         <p14:creationId xmlns:p14="http://schemas.microsoft.com/office/powerpoint/2010/main" val="4105545054"/>
+      </p:ext>
+    </p:extLst>
+  </p:cSld>
+  <p:clrMapOvr>
+    <a:masterClrMapping/>
+  </p:clrMapOvr>
+</p:notes>
+</file>
+
+<file path=ppt/notesSlides/notesSlide6.xml><?xml version="1.0" encoding="utf-8"?>
+<p:notes xmlns:a="http://schemas.openxmlformats.org/drawingml/2006/main" xmlns:r="http://schemas.openxmlformats.org/officeDocument/2006/relationships" xmlns:p="http://schemas.openxmlformats.org/presentationml/2006/main">
+  <p:cSld>
+    <p:spTree>
+      <p:nvGrpSpPr>
+        <p:cNvPr id="1" name=""/>
+        <p:cNvGrpSpPr/>
+        <p:nvPr/>
+      </p:nvGrpSpPr>
+      <p:grpSpPr>
+        <a:xfrm>
+          <a:off x="0" y="0"/>
+          <a:ext cx="0" cy="0"/>
+          <a:chOff x="0" y="0"/>
+          <a:chExt cx="0" cy="0"/>
+        </a:xfrm>
+      </p:grpSpPr>
+      <p:sp>
+        <p:nvSpPr>
+          <p:cNvPr id="2" name="Slide Image Placeholder 1"/>
+          <p:cNvSpPr>
+            <a:spLocks noGrp="1" noRot="1" noChangeAspect="1"/>
+          </p:cNvSpPr>
+          <p:nvPr>
+            <p:ph type="sldImg"/>
+          </p:nvPr>
+        </p:nvSpPr>
+        <p:spPr/>
+      </p:sp>
+      <p:sp>
+        <p:nvSpPr>
+          <p:cNvPr id="3" name="Notes Placeholder 2"/>
+          <p:cNvSpPr>
+            <a:spLocks noGrp="1"/>
+          </p:cNvSpPr>
+          <p:nvPr>
+            <p:ph type="body" idx="1"/>
+          </p:nvPr>
+        </p:nvSpPr>
+        <p:spPr/>
+        <p:txBody>
+          <a:bodyPr/>
+          <a:lstStyle/>
+          <a:p>
+            <a:r>
+              <a:rPr lang="en-US" dirty="0"/>
+              <a:t>-Natural disasters that are increasing, are spreading to new areas, causing more widespread harm, not just localized harm</a:t>
+            </a:r>
+          </a:p>
+          <a:p>
+            <a:endParaRPr lang="en-US" dirty="0"/>
+          </a:p>
+          <a:p>
+            <a:r>
+              <a:rPr lang="en-US" dirty="0"/>
+              <a:t>-DEATH TOLL DECREASE: most likely due to preparedness but we don’t have that data to be certain</a:t>
+            </a:r>
+          </a:p>
+        </p:txBody>
+      </p:sp>
+      <p:sp>
+        <p:nvSpPr>
+          <p:cNvPr id="4" name="Slide Number Placeholder 3"/>
+          <p:cNvSpPr>
+            <a:spLocks noGrp="1"/>
+          </p:cNvSpPr>
+          <p:nvPr>
+            <p:ph type="sldNum" sz="quarter" idx="5"/>
+          </p:nvPr>
+        </p:nvSpPr>
+        <p:spPr/>
+        <p:txBody>
+          <a:bodyPr/>
+          <a:lstStyle/>
+          <a:p>
+            <a:fld id="{97A8A3DF-6C8A-C742-B4C9-A657098D1157}" type="slidenum">
+              <a:rPr lang="en-US" smtClean="0"/>
+              <a:t>8</a:t>
+            </a:fld>
+            <a:endParaRPr lang="en-US"/>
+          </a:p>
+        </p:txBody>
+      </p:sp>
+    </p:spTree>
+    <p:extLst>
+      <p:ext uri="{BB962C8B-B14F-4D97-AF65-F5344CB8AC3E}">
+        <p14:creationId xmlns:p14="http://schemas.microsoft.com/office/powerpoint/2010/main" val="685884089"/>
       </p:ext>
     </p:extLst>
   </p:cSld>
@@ -9806,6 +9903,116 @@
     <p:extLst>
       <p:ext uri="{BB962C8B-B14F-4D97-AF65-F5344CB8AC3E}">
         <p14:creationId xmlns:p14="http://schemas.microsoft.com/office/powerpoint/2010/main" val="1045471324"/>
+      </p:ext>
+    </p:extLst>
+  </p:cSld>
+  <p:clrMapOvr>
+    <a:masterClrMapping/>
+  </p:clrMapOvr>
+</p:sld>
+</file>
+
+<file path=ppt/slides/slide8.xml><?xml version="1.0" encoding="utf-8"?>
+<p:sld xmlns:a="http://schemas.openxmlformats.org/drawingml/2006/main" xmlns:r="http://schemas.openxmlformats.org/officeDocument/2006/relationships" xmlns:p="http://schemas.openxmlformats.org/presentationml/2006/main">
+  <p:cSld>
+    <p:spTree>
+      <p:nvGrpSpPr>
+        <p:cNvPr id="1" name=""/>
+        <p:cNvGrpSpPr/>
+        <p:nvPr/>
+      </p:nvGrpSpPr>
+      <p:grpSpPr>
+        <a:xfrm>
+          <a:off x="0" y="0"/>
+          <a:ext cx="0" cy="0"/>
+          <a:chOff x="0" y="0"/>
+          <a:chExt cx="0" cy="0"/>
+        </a:xfrm>
+      </p:grpSpPr>
+      <p:sp>
+        <p:nvSpPr>
+          <p:cNvPr id="2" name="Title 1">
+            <a:extLst>
+              <a:ext uri="{FF2B5EF4-FFF2-40B4-BE49-F238E27FC236}">
+                <a16:creationId xmlns:a16="http://schemas.microsoft.com/office/drawing/2014/main" id="{C31A03F1-532B-54B1-37AA-FAA482CB77E1}"/>
+              </a:ext>
+            </a:extLst>
+          </p:cNvPr>
+          <p:cNvSpPr>
+            <a:spLocks noGrp="1"/>
+          </p:cNvSpPr>
+          <p:nvPr>
+            <p:ph type="title"/>
+          </p:nvPr>
+        </p:nvSpPr>
+        <p:spPr/>
+        <p:txBody>
+          <a:bodyPr/>
+          <a:lstStyle/>
+          <a:p>
+            <a:r>
+              <a:rPr lang="en-US" dirty="0"/>
+              <a:t>Conclusions</a:t>
+            </a:r>
+          </a:p>
+        </p:txBody>
+      </p:sp>
+      <p:sp>
+        <p:nvSpPr>
+          <p:cNvPr id="3" name="Content Placeholder 2">
+            <a:extLst>
+              <a:ext uri="{FF2B5EF4-FFF2-40B4-BE49-F238E27FC236}">
+                <a16:creationId xmlns:a16="http://schemas.microsoft.com/office/drawing/2014/main" id="{A251C3BD-353E-4A89-5ACB-BB9ABB28DF60}"/>
+              </a:ext>
+            </a:extLst>
+          </p:cNvPr>
+          <p:cNvSpPr>
+            <a:spLocks noGrp="1"/>
+          </p:cNvSpPr>
+          <p:nvPr>
+            <p:ph idx="1"/>
+          </p:nvPr>
+        </p:nvSpPr>
+        <p:spPr/>
+        <p:txBody>
+          <a:bodyPr/>
+          <a:lstStyle/>
+          <a:p>
+            <a:r>
+              <a:rPr lang="en-US" dirty="0"/>
+              <a:t>Global temperature anomalies are increasing over the years</a:t>
+            </a:r>
+          </a:p>
+          <a:p>
+            <a:r>
+              <a:rPr lang="en-US" dirty="0"/>
+              <a:t>Most natural disasters are not increasing in frequency</a:t>
+            </a:r>
+          </a:p>
+          <a:p>
+            <a:r>
+              <a:rPr lang="en-US" dirty="0"/>
+              <a:t>Hurricanes, fires, and severe storms ARE increasing in frequency</a:t>
+            </a:r>
+          </a:p>
+          <a:p>
+            <a:r>
+              <a:rPr lang="en-US" dirty="0"/>
+              <a:t>Death toll is decreasing</a:t>
+            </a:r>
+          </a:p>
+          <a:p>
+            <a:endParaRPr lang="en-US" dirty="0"/>
+          </a:p>
+          <a:p>
+            <a:endParaRPr lang="en-US" dirty="0"/>
+          </a:p>
+        </p:txBody>
+      </p:sp>
+    </p:spTree>
+    <p:extLst>
+      <p:ext uri="{BB962C8B-B14F-4D97-AF65-F5344CB8AC3E}">
+        <p14:creationId xmlns:p14="http://schemas.microsoft.com/office/powerpoint/2010/main" val="4016648642"/>
       </p:ext>
     </p:extLst>
   </p:cSld>

</xml_diff>

<commit_message>
added Dashboard Background slide to pp
</commit_message>
<xml_diff>
--- a/Project-3.pptx
+++ b/Project-3.pptx
@@ -5,17 +5,18 @@
     <p:sldMasterId id="2147483648" r:id="rId1"/>
   </p:sldMasterIdLst>
   <p:notesMasterIdLst>
-    <p:notesMasterId r:id="rId10"/>
+    <p:notesMasterId r:id="rId11"/>
   </p:notesMasterIdLst>
   <p:sldIdLst>
     <p:sldId id="256" r:id="rId2"/>
     <p:sldId id="257" r:id="rId3"/>
     <p:sldId id="258" r:id="rId4"/>
-    <p:sldId id="259" r:id="rId5"/>
-    <p:sldId id="260" r:id="rId6"/>
-    <p:sldId id="261" r:id="rId7"/>
-    <p:sldId id="262" r:id="rId8"/>
-    <p:sldId id="263" r:id="rId9"/>
+    <p:sldId id="264" r:id="rId5"/>
+    <p:sldId id="259" r:id="rId6"/>
+    <p:sldId id="260" r:id="rId7"/>
+    <p:sldId id="261" r:id="rId8"/>
+    <p:sldId id="262" r:id="rId9"/>
+    <p:sldId id="263" r:id="rId10"/>
   </p:sldIdLst>
   <p:sldSz cx="12192000" cy="6858000"/>
   <p:notesSz cx="6858000" cy="9144000"/>
@@ -683,166 +684,6 @@
           <a:bodyPr/>
           <a:lstStyle/>
           <a:p>
-            <a:r>
-              <a:rPr lang="en-US" b="0" i="0" dirty="0">
-                <a:solidFill>
-                  <a:srgbClr val="1D1C1D"/>
-                </a:solidFill>
-                <a:effectLst/>
-                <a:latin typeface="Slack-Lato"/>
-              </a:rPr>
-              <a:t>1. because jQuery is only for general </a:t>
-            </a:r>
-            <a:r>
-              <a:rPr lang="en-US" b="0" i="0" dirty="0" err="1">
-                <a:solidFill>
-                  <a:srgbClr val="1D1C1D"/>
-                </a:solidFill>
-                <a:effectLst/>
-                <a:latin typeface="Slack-Lato"/>
-              </a:rPr>
-              <a:t>dom</a:t>
-            </a:r>
-            <a:r>
-              <a:rPr lang="en-US" b="0" i="0" dirty="0">
-                <a:solidFill>
-                  <a:srgbClr val="1D1C1D"/>
-                </a:solidFill>
-                <a:effectLst/>
-                <a:latin typeface="Slack-Lato"/>
-              </a:rPr>
-              <a:t> manipulation, it's faster. we were making a web app, and so we went with a library for creating web apps</a:t>
-            </a:r>
-            <a:br>
-              <a:rPr lang="en-US" dirty="0"/>
-            </a:br>
-            <a:r>
-              <a:rPr lang="en-US" b="0" i="0" dirty="0">
-                <a:solidFill>
-                  <a:srgbClr val="1D1C1D"/>
-                </a:solidFill>
-                <a:effectLst/>
-                <a:latin typeface="Slack-Lato"/>
-              </a:rPr>
-              <a:t>2. narrower library scope means smaller size of the library - ~160 kilobytes isn't much, but you're not always going to be building for people with good internet connections</a:t>
-            </a:r>
-            <a:br>
-              <a:rPr lang="en-US" dirty="0"/>
-            </a:br>
-            <a:r>
-              <a:rPr lang="en-US" b="0" i="0" dirty="0">
-                <a:solidFill>
-                  <a:srgbClr val="1D1C1D"/>
-                </a:solidFill>
-                <a:effectLst/>
-                <a:latin typeface="Slack-Lato"/>
-              </a:rPr>
-              <a:t>3. </a:t>
-            </a:r>
-            <a:r>
-              <a:rPr lang="en-US" b="0" i="0" dirty="0" err="1">
-                <a:solidFill>
-                  <a:srgbClr val="1D1C1D"/>
-                </a:solidFill>
-                <a:effectLst/>
-                <a:latin typeface="Slack-Lato"/>
-              </a:rPr>
-              <a:t>i</a:t>
-            </a:r>
-            <a:r>
-              <a:rPr lang="en-US" b="0" i="0" dirty="0">
-                <a:solidFill>
-                  <a:srgbClr val="1D1C1D"/>
-                </a:solidFill>
-                <a:effectLst/>
-                <a:latin typeface="Slack-Lato"/>
-              </a:rPr>
-              <a:t> didn't see the point of d3 making </a:t>
-            </a:r>
-            <a:r>
-              <a:rPr lang="en-US" dirty="0"/>
-              <a:t>d3.json()</a:t>
-            </a:r>
-            <a:r>
-              <a:rPr lang="en-US" b="0" i="0" dirty="0">
-                <a:solidFill>
-                  <a:srgbClr val="1D1C1D"/>
-                </a:solidFill>
-                <a:effectLst/>
-                <a:latin typeface="Slack-Lato"/>
-              </a:rPr>
-              <a:t> return a Promise? </a:t>
-            </a:r>
-            <a:r>
-              <a:rPr lang="en-US" dirty="0"/>
-              <a:t>$.</a:t>
-            </a:r>
-            <a:r>
-              <a:rPr lang="en-US" dirty="0" err="1"/>
-              <a:t>getJSON</a:t>
-            </a:r>
-            <a:r>
-              <a:rPr lang="en-US" dirty="0"/>
-              <a:t>(</a:t>
-            </a:r>
-            <a:r>
-              <a:rPr lang="en-US" dirty="0" err="1"/>
-              <a:t>url</a:t>
-            </a:r>
-            <a:r>
-              <a:rPr lang="en-US" dirty="0"/>
-              <a:t>, function)</a:t>
-            </a:r>
-            <a:r>
-              <a:rPr lang="en-US" b="0" i="0" dirty="0">
-                <a:solidFill>
-                  <a:srgbClr val="1D1C1D"/>
-                </a:solidFill>
-                <a:effectLst/>
-                <a:latin typeface="Slack-Lato"/>
-              </a:rPr>
-              <a:t> sticks d3's "then" function directly into the </a:t>
-            </a:r>
-            <a:r>
-              <a:rPr lang="en-US" b="0" i="0" dirty="0" err="1">
-                <a:solidFill>
-                  <a:srgbClr val="1D1C1D"/>
-                </a:solidFill>
-                <a:effectLst/>
-                <a:latin typeface="Slack-Lato"/>
-              </a:rPr>
-              <a:t>url</a:t>
-            </a:r>
-            <a:r>
-              <a:rPr lang="en-US" b="0" i="0" dirty="0">
-                <a:solidFill>
-                  <a:srgbClr val="1D1C1D"/>
-                </a:solidFill>
-                <a:effectLst/>
-                <a:latin typeface="Slack-Lato"/>
-              </a:rPr>
-              <a:t> request - not only does this make more sense, but it also allows you to see this functionality directly on the same page in the </a:t>
-            </a:r>
-            <a:r>
-              <a:rPr lang="en-US" b="0" i="0" dirty="0" err="1">
-                <a:solidFill>
-                  <a:srgbClr val="1D1C1D"/>
-                </a:solidFill>
-                <a:effectLst/>
-                <a:latin typeface="Slack-Lato"/>
-              </a:rPr>
-              <a:t>jquery</a:t>
-            </a:r>
-            <a:r>
-              <a:rPr lang="en-US" b="0" i="0" dirty="0">
-                <a:solidFill>
-                  <a:srgbClr val="1D1C1D"/>
-                </a:solidFill>
-                <a:effectLst/>
-                <a:latin typeface="Slack-Lato"/>
-              </a:rPr>
-              <a:t> documentation, instead of having to be pointed to another web page for the "then" documentation</a:t>
-            </a:r>
             <a:endParaRPr lang="en-US" dirty="0"/>
           </a:p>
         </p:txBody>
@@ -873,7 +714,7 @@
     </p:spTree>
     <p:extLst>
       <p:ext uri="{BB962C8B-B14F-4D97-AF65-F5344CB8AC3E}">
-        <p14:creationId xmlns:p14="http://schemas.microsoft.com/office/powerpoint/2010/main" val="4191555918"/>
+        <p14:creationId xmlns:p14="http://schemas.microsoft.com/office/powerpoint/2010/main" val="3220400219"/>
       </p:ext>
     </p:extLst>
   </p:cSld>
@@ -935,11 +776,18 @@
                 <a:effectLst/>
                 <a:latin typeface="Slack-Lato"/>
               </a:rPr>
-              <a:t>1. you can specify parameters as you want, in any order, by name.</a:t>
-            </a:r>
-            <a:br>
-              <a:rPr lang="en-US" dirty="0"/>
-            </a:br>
+              <a:t>1. because jQuery is only for general </a:t>
+            </a:r>
+            <a:r>
+              <a:rPr lang="en-US" b="0" i="0" dirty="0" err="1">
+                <a:solidFill>
+                  <a:srgbClr val="1D1C1D"/>
+                </a:solidFill>
+                <a:effectLst/>
+                <a:latin typeface="Slack-Lato"/>
+              </a:rPr>
+              <a:t>dom</a:t>
+            </a:r>
             <a:r>
               <a:rPr lang="en-US" b="0" i="0" dirty="0">
                 <a:solidFill>
@@ -948,7 +796,97 @@
                 <a:effectLst/>
                 <a:latin typeface="Slack-Lato"/>
               </a:rPr>
-              <a:t>2. you can use one endpoint for more different types of queries, based on whether or not a parameter exists in the </a:t>
+              <a:t> manipulation, it's faster. we were making a web app, and so we went with a library for creating web apps</a:t>
+            </a:r>
+            <a:br>
+              <a:rPr lang="en-US" dirty="0"/>
+            </a:br>
+            <a:r>
+              <a:rPr lang="en-US" b="0" i="0" dirty="0">
+                <a:solidFill>
+                  <a:srgbClr val="1D1C1D"/>
+                </a:solidFill>
+                <a:effectLst/>
+                <a:latin typeface="Slack-Lato"/>
+              </a:rPr>
+              <a:t>2. narrower library scope means smaller size of the library - ~160 kilobytes isn't much, but you're not always going to be building for people with good internet connections</a:t>
+            </a:r>
+            <a:br>
+              <a:rPr lang="en-US" dirty="0"/>
+            </a:br>
+            <a:r>
+              <a:rPr lang="en-US" b="0" i="0" dirty="0">
+                <a:solidFill>
+                  <a:srgbClr val="1D1C1D"/>
+                </a:solidFill>
+                <a:effectLst/>
+                <a:latin typeface="Slack-Lato"/>
+              </a:rPr>
+              <a:t>3. </a:t>
+            </a:r>
+            <a:r>
+              <a:rPr lang="en-US" b="0" i="0" dirty="0" err="1">
+                <a:solidFill>
+                  <a:srgbClr val="1D1C1D"/>
+                </a:solidFill>
+                <a:effectLst/>
+                <a:latin typeface="Slack-Lato"/>
+              </a:rPr>
+              <a:t>i</a:t>
+            </a:r>
+            <a:r>
+              <a:rPr lang="en-US" b="0" i="0" dirty="0">
+                <a:solidFill>
+                  <a:srgbClr val="1D1C1D"/>
+                </a:solidFill>
+                <a:effectLst/>
+                <a:latin typeface="Slack-Lato"/>
+              </a:rPr>
+              <a:t> didn't see the point of d3 making </a:t>
+            </a:r>
+            <a:r>
+              <a:rPr lang="en-US" dirty="0"/>
+              <a:t>d3.json()</a:t>
+            </a:r>
+            <a:r>
+              <a:rPr lang="en-US" b="0" i="0" dirty="0">
+                <a:solidFill>
+                  <a:srgbClr val="1D1C1D"/>
+                </a:solidFill>
+                <a:effectLst/>
+                <a:latin typeface="Slack-Lato"/>
+              </a:rPr>
+              <a:t> return a Promise? </a:t>
+            </a:r>
+            <a:r>
+              <a:rPr lang="en-US" dirty="0"/>
+              <a:t>$.</a:t>
+            </a:r>
+            <a:r>
+              <a:rPr lang="en-US" dirty="0" err="1"/>
+              <a:t>getJSON</a:t>
+            </a:r>
+            <a:r>
+              <a:rPr lang="en-US" dirty="0"/>
+              <a:t>(</a:t>
+            </a:r>
+            <a:r>
+              <a:rPr lang="en-US" dirty="0" err="1"/>
+              <a:t>url</a:t>
+            </a:r>
+            <a:r>
+              <a:rPr lang="en-US" dirty="0"/>
+              <a:t>, function)</a:t>
+            </a:r>
+            <a:r>
+              <a:rPr lang="en-US" b="0" i="0" dirty="0">
+                <a:solidFill>
+                  <a:srgbClr val="1D1C1D"/>
+                </a:solidFill>
+                <a:effectLst/>
+                <a:latin typeface="Slack-Lato"/>
+              </a:rPr>
+              <a:t> sticks d3's "then" function directly into the </a:t>
             </a:r>
             <a:r>
               <a:rPr lang="en-US" b="0" i="0" dirty="0" err="1">
@@ -960,9 +898,6 @@
               </a:rPr>
               <a:t>url</a:t>
             </a:r>
-            <a:br>
-              <a:rPr lang="en-US" dirty="0"/>
-            </a:br>
             <a:r>
               <a:rPr lang="en-US" b="0" i="0" dirty="0">
                 <a:solidFill>
@@ -971,11 +906,18 @@
                 <a:effectLst/>
                 <a:latin typeface="Slack-Lato"/>
               </a:rPr>
-              <a:t>3. adding or removing functionality to a specific query type means just changing a few lines of code, instead of: the endpoint, the function header, the code, possibly creating a new function...</a:t>
-            </a:r>
-            <a:br>
-              <a:rPr lang="en-US" dirty="0"/>
-            </a:br>
+              <a:t> request - not only does this make more sense, but it also allows you to see this functionality directly on the same page in the </a:t>
+            </a:r>
+            <a:r>
+              <a:rPr lang="en-US" b="0" i="0" dirty="0" err="1">
+                <a:solidFill>
+                  <a:srgbClr val="1D1C1D"/>
+                </a:solidFill>
+                <a:effectLst/>
+                <a:latin typeface="Slack-Lato"/>
+              </a:rPr>
+              <a:t>jquery</a:t>
+            </a:r>
             <a:r>
               <a:rPr lang="en-US" b="0" i="0" dirty="0">
                 <a:solidFill>
@@ -984,67 +926,7 @@
                 <a:effectLst/>
                 <a:latin typeface="Slack-Lato"/>
               </a:rPr>
-              <a:t>4. end-users (people using the </a:t>
-            </a:r>
-            <a:r>
-              <a:rPr lang="en-US" b="0" i="0" dirty="0" err="1">
-                <a:solidFill>
-                  <a:srgbClr val="1D1C1D"/>
-                </a:solidFill>
-                <a:effectLst/>
-                <a:latin typeface="Slack-Lato"/>
-              </a:rPr>
-              <a:t>api</a:t>
-            </a:r>
-            <a:r>
-              <a:rPr lang="en-US" b="0" i="0" dirty="0">
-                <a:solidFill>
-                  <a:srgbClr val="1D1C1D"/>
-                </a:solidFill>
-                <a:effectLst/>
-                <a:latin typeface="Slack-Lato"/>
-              </a:rPr>
-              <a:t> from their </a:t>
-            </a:r>
-            <a:r>
-              <a:rPr lang="en-US" b="0" i="0" dirty="0" err="1">
-                <a:solidFill>
-                  <a:srgbClr val="1D1C1D"/>
-                </a:solidFill>
-                <a:effectLst/>
-                <a:latin typeface="Slack-Lato"/>
-              </a:rPr>
-              <a:t>javascript</a:t>
-            </a:r>
-            <a:r>
-              <a:rPr lang="en-US" b="0" i="0" dirty="0">
-                <a:solidFill>
-                  <a:srgbClr val="1D1C1D"/>
-                </a:solidFill>
-                <a:effectLst/>
-                <a:latin typeface="Slack-Lato"/>
-              </a:rPr>
-              <a:t>) probably won't have to change their code to get the same results when the </a:t>
-            </a:r>
-            <a:r>
-              <a:rPr lang="en-US" b="0" i="0" dirty="0" err="1">
-                <a:solidFill>
-                  <a:srgbClr val="1D1C1D"/>
-                </a:solidFill>
-                <a:effectLst/>
-                <a:latin typeface="Slack-Lato"/>
-              </a:rPr>
-              <a:t>api</a:t>
-            </a:r>
-            <a:r>
-              <a:rPr lang="en-US" b="0" i="0" dirty="0">
-                <a:solidFill>
-                  <a:srgbClr val="1D1C1D"/>
-                </a:solidFill>
-                <a:effectLst/>
-                <a:latin typeface="Slack-Lato"/>
-              </a:rPr>
-              <a:t> is updated</a:t>
+              <a:t> documentation, instead of having to be pointed to another web page for the "then" documentation</a:t>
             </a:r>
             <a:endParaRPr lang="en-US" dirty="0"/>
           </a:p>
@@ -1076,7 +958,7 @@
     </p:spTree>
     <p:extLst>
       <p:ext uri="{BB962C8B-B14F-4D97-AF65-F5344CB8AC3E}">
-        <p14:creationId xmlns:p14="http://schemas.microsoft.com/office/powerpoint/2010/main" val="2451951576"/>
+        <p14:creationId xmlns:p14="http://schemas.microsoft.com/office/powerpoint/2010/main" val="4191555918"/>
       </p:ext>
     </p:extLst>
   </p:cSld>
@@ -1138,7 +1020,7 @@
                 <a:effectLst/>
                 <a:latin typeface="Slack-Lato"/>
               </a:rPr>
-              <a:t>1. the database needs to be opened, read from, and closed each time a query is made. using reflection for this would be needlessly slow, having to analyze the database every call, because... (of point 2)</a:t>
+              <a:t>1. you can specify parameters as you want, in any order, by name.</a:t>
             </a:r>
             <a:br>
               <a:rPr lang="en-US" dirty="0"/>
@@ -1151,7 +1033,43 @@
                 <a:effectLst/>
                 <a:latin typeface="Slack-Lato"/>
               </a:rPr>
-              <a:t>2. we're not retrieving unknown tables from an unknown database. we made the database, we made the tables, we know exactly what it looks like. a few minutes now saves us time on every </a:t>
+              <a:t>2. you can use one endpoint for more different types of queries, based on whether or not a parameter exists in the </a:t>
+            </a:r>
+            <a:r>
+              <a:rPr lang="en-US" b="0" i="0" dirty="0" err="1">
+                <a:solidFill>
+                  <a:srgbClr val="1D1C1D"/>
+                </a:solidFill>
+                <a:effectLst/>
+                <a:latin typeface="Slack-Lato"/>
+              </a:rPr>
+              <a:t>url</a:t>
+            </a:r>
+            <a:br>
+              <a:rPr lang="en-US" dirty="0"/>
+            </a:br>
+            <a:r>
+              <a:rPr lang="en-US" b="0" i="0" dirty="0">
+                <a:solidFill>
+                  <a:srgbClr val="1D1C1D"/>
+                </a:solidFill>
+                <a:effectLst/>
+                <a:latin typeface="Slack-Lato"/>
+              </a:rPr>
+              <a:t>3. adding or removing functionality to a specific query type means just changing a few lines of code, instead of: the endpoint, the function header, the code, possibly creating a new function...</a:t>
+            </a:r>
+            <a:br>
+              <a:rPr lang="en-US" dirty="0"/>
+            </a:br>
+            <a:r>
+              <a:rPr lang="en-US" b="0" i="0" dirty="0">
+                <a:solidFill>
+                  <a:srgbClr val="1D1C1D"/>
+                </a:solidFill>
+                <a:effectLst/>
+                <a:latin typeface="Slack-Lato"/>
+              </a:rPr>
+              <a:t>4. end-users (people using the </a:t>
             </a:r>
             <a:r>
               <a:rPr lang="en-US" b="0" i="0" dirty="0" err="1">
@@ -1171,11 +1089,18 @@
                 <a:effectLst/>
                 <a:latin typeface="Slack-Lato"/>
               </a:rPr>
-              <a:t> call later</a:t>
-            </a:r>
-            <a:br>
-              <a:rPr lang="en-US" dirty="0"/>
-            </a:br>
+              <a:t> from their </a:t>
+            </a:r>
+            <a:r>
+              <a:rPr lang="en-US" b="0" i="0" dirty="0" err="1">
+                <a:solidFill>
+                  <a:srgbClr val="1D1C1D"/>
+                </a:solidFill>
+                <a:effectLst/>
+                <a:latin typeface="Slack-Lato"/>
+              </a:rPr>
+              <a:t>javascript</a:t>
+            </a:r>
             <a:r>
               <a:rPr lang="en-US" b="0" i="0" dirty="0">
                 <a:solidFill>
@@ -1184,11 +1109,17 @@
                 <a:effectLst/>
                 <a:latin typeface="Slack-Lato"/>
               </a:rPr>
-              <a:t>3. because we defined the tables directly, we're able to use them to build queries while the table is closed. we can build those queries and then use a single helper function (</a:t>
-            </a:r>
-            <a:r>
-              <a:rPr lang="en-US" dirty="0" err="1"/>
-              <a:t>run_sql_command</a:t>
+              <a:t>) probably won't have to change their code to get the same results when the </a:t>
+            </a:r>
+            <a:r>
+              <a:rPr lang="en-US" b="0" i="0" dirty="0" err="1">
+                <a:solidFill>
+                  <a:srgbClr val="1D1C1D"/>
+                </a:solidFill>
+                <a:effectLst/>
+                <a:latin typeface="Slack-Lato"/>
+              </a:rPr>
+              <a:t>api</a:t>
             </a:r>
             <a:r>
               <a:rPr lang="en-US" b="0" i="0" dirty="0">
@@ -1198,7 +1129,7 @@
                 <a:effectLst/>
                 <a:latin typeface="Slack-Lato"/>
               </a:rPr>
-              <a:t>) to handle the actual database manipulation</a:t>
+              <a:t> is updated</a:t>
             </a:r>
             <a:endParaRPr lang="en-US" dirty="0"/>
           </a:p>
@@ -1230,7 +1161,7 @@
     </p:spTree>
     <p:extLst>
       <p:ext uri="{BB962C8B-B14F-4D97-AF65-F5344CB8AC3E}">
-        <p14:creationId xmlns:p14="http://schemas.microsoft.com/office/powerpoint/2010/main" val="4105545054"/>
+        <p14:creationId xmlns:p14="http://schemas.microsoft.com/office/powerpoint/2010/main" val="2451951576"/>
       </p:ext>
     </p:extLst>
   </p:cSld>
@@ -1285,6 +1216,160 @@
           <a:lstStyle/>
           <a:p>
             <a:r>
+              <a:rPr lang="en-US" b="0" i="0" dirty="0">
+                <a:solidFill>
+                  <a:srgbClr val="1D1C1D"/>
+                </a:solidFill>
+                <a:effectLst/>
+                <a:latin typeface="Slack-Lato"/>
+              </a:rPr>
+              <a:t>1. the database needs to be opened, read from, and closed each time a query is made. using reflection for this would be needlessly slow, having to analyze the database every call, because... (of point 2)</a:t>
+            </a:r>
+            <a:br>
+              <a:rPr lang="en-US" dirty="0"/>
+            </a:br>
+            <a:r>
+              <a:rPr lang="en-US" b="0" i="0" dirty="0">
+                <a:solidFill>
+                  <a:srgbClr val="1D1C1D"/>
+                </a:solidFill>
+                <a:effectLst/>
+                <a:latin typeface="Slack-Lato"/>
+              </a:rPr>
+              <a:t>2. we're not retrieving unknown tables from an unknown database. we made the database, we made the tables, we know exactly what it looks like. a few minutes now saves us time on every </a:t>
+            </a:r>
+            <a:r>
+              <a:rPr lang="en-US" b="0" i="0" dirty="0" err="1">
+                <a:solidFill>
+                  <a:srgbClr val="1D1C1D"/>
+                </a:solidFill>
+                <a:effectLst/>
+                <a:latin typeface="Slack-Lato"/>
+              </a:rPr>
+              <a:t>api</a:t>
+            </a:r>
+            <a:r>
+              <a:rPr lang="en-US" b="0" i="0" dirty="0">
+                <a:solidFill>
+                  <a:srgbClr val="1D1C1D"/>
+                </a:solidFill>
+                <a:effectLst/>
+                <a:latin typeface="Slack-Lato"/>
+              </a:rPr>
+              <a:t> call later</a:t>
+            </a:r>
+            <a:br>
+              <a:rPr lang="en-US" dirty="0"/>
+            </a:br>
+            <a:r>
+              <a:rPr lang="en-US" b="0" i="0" dirty="0">
+                <a:solidFill>
+                  <a:srgbClr val="1D1C1D"/>
+                </a:solidFill>
+                <a:effectLst/>
+                <a:latin typeface="Slack-Lato"/>
+              </a:rPr>
+              <a:t>3. because we defined the tables directly, we're able to use them to build queries while the table is closed. we can build those queries and then use a single helper function (</a:t>
+            </a:r>
+            <a:r>
+              <a:rPr lang="en-US" dirty="0" err="1"/>
+              <a:t>run_sql_command</a:t>
+            </a:r>
+            <a:r>
+              <a:rPr lang="en-US" b="0" i="0" dirty="0">
+                <a:solidFill>
+                  <a:srgbClr val="1D1C1D"/>
+                </a:solidFill>
+                <a:effectLst/>
+                <a:latin typeface="Slack-Lato"/>
+              </a:rPr>
+              <a:t>) to handle the actual database manipulation</a:t>
+            </a:r>
+            <a:endParaRPr lang="en-US" dirty="0"/>
+          </a:p>
+        </p:txBody>
+      </p:sp>
+      <p:sp>
+        <p:nvSpPr>
+          <p:cNvPr id="4" name="Slide Number Placeholder 3"/>
+          <p:cNvSpPr>
+            <a:spLocks noGrp="1"/>
+          </p:cNvSpPr>
+          <p:nvPr>
+            <p:ph type="sldNum" sz="quarter" idx="5"/>
+          </p:nvPr>
+        </p:nvSpPr>
+        <p:spPr/>
+        <p:txBody>
+          <a:bodyPr/>
+          <a:lstStyle/>
+          <a:p>
+            <a:fld id="{97A8A3DF-6C8A-C742-B4C9-A657098D1157}" type="slidenum">
+              <a:rPr lang="en-US" smtClean="0"/>
+              <a:t>7</a:t>
+            </a:fld>
+            <a:endParaRPr lang="en-US"/>
+          </a:p>
+        </p:txBody>
+      </p:sp>
+    </p:spTree>
+    <p:extLst>
+      <p:ext uri="{BB962C8B-B14F-4D97-AF65-F5344CB8AC3E}">
+        <p14:creationId xmlns:p14="http://schemas.microsoft.com/office/powerpoint/2010/main" val="4105545054"/>
+      </p:ext>
+    </p:extLst>
+  </p:cSld>
+  <p:clrMapOvr>
+    <a:masterClrMapping/>
+  </p:clrMapOvr>
+</p:notes>
+</file>
+
+<file path=ppt/notesSlides/notesSlide7.xml><?xml version="1.0" encoding="utf-8"?>
+<p:notes xmlns:a="http://schemas.openxmlformats.org/drawingml/2006/main" xmlns:r="http://schemas.openxmlformats.org/officeDocument/2006/relationships" xmlns:p="http://schemas.openxmlformats.org/presentationml/2006/main">
+  <p:cSld>
+    <p:spTree>
+      <p:nvGrpSpPr>
+        <p:cNvPr id="1" name=""/>
+        <p:cNvGrpSpPr/>
+        <p:nvPr/>
+      </p:nvGrpSpPr>
+      <p:grpSpPr>
+        <a:xfrm>
+          <a:off x="0" y="0"/>
+          <a:ext cx="0" cy="0"/>
+          <a:chOff x="0" y="0"/>
+          <a:chExt cx="0" cy="0"/>
+        </a:xfrm>
+      </p:grpSpPr>
+      <p:sp>
+        <p:nvSpPr>
+          <p:cNvPr id="2" name="Slide Image Placeholder 1"/>
+          <p:cNvSpPr>
+            <a:spLocks noGrp="1" noRot="1" noChangeAspect="1"/>
+          </p:cNvSpPr>
+          <p:nvPr>
+            <p:ph type="sldImg"/>
+          </p:nvPr>
+        </p:nvSpPr>
+        <p:spPr/>
+      </p:sp>
+      <p:sp>
+        <p:nvSpPr>
+          <p:cNvPr id="3" name="Notes Placeholder 2"/>
+          <p:cNvSpPr>
+            <a:spLocks noGrp="1"/>
+          </p:cNvSpPr>
+          <p:nvPr>
+            <p:ph type="body" idx="1"/>
+          </p:nvPr>
+        </p:nvSpPr>
+        <p:spPr/>
+        <p:txBody>
+          <a:bodyPr/>
+          <a:lstStyle/>
+          <a:p>
+            <a:r>
               <a:rPr lang="en-US" dirty="0"/>
               <a:t>-Natural disasters that are increasing, are spreading to new areas, causing more widespread harm, not just localized harm</a:t>
             </a:r>
@@ -1317,7 +1402,7 @@
           <a:p>
             <a:fld id="{97A8A3DF-6C8A-C742-B4C9-A657098D1157}" type="slidenum">
               <a:rPr lang="en-US" smtClean="0"/>
-              <a:t>8</a:t>
+              <a:t>9</a:t>
             </a:fld>
             <a:endParaRPr lang="en-US"/>
           </a:p>
@@ -9431,7 +9516,7 @@
           <p:cNvPr id="2" name="Title 1">
             <a:extLst>
               <a:ext uri="{FF2B5EF4-FFF2-40B4-BE49-F238E27FC236}">
-                <a16:creationId xmlns:a16="http://schemas.microsoft.com/office/drawing/2014/main" id="{3E68A2FD-7BFB-2042-EEF9-4F63D57A3624}"/>
+                <a16:creationId xmlns:a16="http://schemas.microsoft.com/office/drawing/2014/main" id="{3B547D89-7540-458D-86A9-808C96ED8B8F}"/>
               </a:ext>
             </a:extLst>
           </p:cNvPr>
@@ -9449,79 +9534,17 @@
           <a:p>
             <a:r>
               <a:rPr lang="en-US" dirty="0"/>
-              <a:t>Methods-jQuery over d3.js</a:t>
-            </a:r>
-          </a:p>
-        </p:txBody>
-      </p:sp>
-      <p:sp>
-        <p:nvSpPr>
-          <p:cNvPr id="3" name="Content Placeholder 2">
+              <a:t>Dashboard Background</a:t>
+            </a:r>
+          </a:p>
+        </p:txBody>
+      </p:sp>
+      <p:pic>
+        <p:nvPicPr>
+          <p:cNvPr id="4" name="Picture 3">
             <a:extLst>
               <a:ext uri="{FF2B5EF4-FFF2-40B4-BE49-F238E27FC236}">
-                <a16:creationId xmlns:a16="http://schemas.microsoft.com/office/drawing/2014/main" id="{3C1E3288-7F5F-448F-3C62-9E661D62237F}"/>
-              </a:ext>
-            </a:extLst>
-          </p:cNvPr>
-          <p:cNvSpPr>
-            <a:spLocks noGrp="1"/>
-          </p:cNvSpPr>
-          <p:nvPr>
-            <p:ph idx="1"/>
-          </p:nvPr>
-        </p:nvSpPr>
-        <p:spPr>
-          <a:xfrm>
-            <a:off x="680321" y="2336872"/>
-            <a:ext cx="5956453" cy="4317795"/>
-          </a:xfrm>
-        </p:spPr>
-        <p:txBody>
-          <a:bodyPr/>
-          <a:lstStyle/>
-          <a:p>
-            <a:r>
-              <a:rPr lang="en-US" dirty="0"/>
-              <a:t>More specialized</a:t>
-            </a:r>
-          </a:p>
-          <a:p>
-            <a:r>
-              <a:rPr lang="en-US" dirty="0"/>
-              <a:t>More intuitive</a:t>
-            </a:r>
-          </a:p>
-          <a:p>
-            <a:r>
-              <a:rPr lang="en-US" dirty="0"/>
-              <a:t>1/3 the size</a:t>
-            </a:r>
-          </a:p>
-          <a:p>
-            <a:endParaRPr lang="en-US" dirty="0"/>
-          </a:p>
-          <a:p>
-            <a:r>
-              <a:rPr lang="en-US" dirty="0"/>
-              <a:t>With the use of </a:t>
-            </a:r>
-            <a:r>
-              <a:rPr lang="en-US" dirty="0" err="1"/>
-              <a:t>Plotly</a:t>
-            </a:r>
-            <a:r>
-              <a:rPr lang="en-US" dirty="0"/>
-              <a:t> and Leaflet instead of d3 for our visualizations, jQuery becomes the superior choice</a:t>
-            </a:r>
-          </a:p>
-        </p:txBody>
-      </p:sp>
-      <p:pic>
-        <p:nvPicPr>
-          <p:cNvPr id="6" name="Picture 5" descr="A screenshot of a computer code&#10;&#10;Description automatically generated">
-            <a:extLst>
-              <a:ext uri="{FF2B5EF4-FFF2-40B4-BE49-F238E27FC236}">
-                <a16:creationId xmlns:a16="http://schemas.microsoft.com/office/drawing/2014/main" id="{380FE2FF-CB8A-EA42-2582-44F743C60010}"/>
+                <a16:creationId xmlns:a16="http://schemas.microsoft.com/office/drawing/2014/main" id="{BA445082-169A-BB47-DA15-88E017EE425C}"/>
               </a:ext>
             </a:extLst>
           </p:cNvPr>
@@ -9538,8 +9561,8 @@
         </p:blipFill>
         <p:spPr>
           <a:xfrm>
-            <a:off x="6651330" y="2336872"/>
-            <a:ext cx="5167671" cy="3835063"/>
+            <a:off x="1692491" y="2118287"/>
+            <a:ext cx="8431636" cy="4511113"/>
           </a:xfrm>
           <a:prstGeom prst="rect">
             <a:avLst/>
@@ -9549,7 +9572,7 @@
     </p:spTree>
     <p:extLst>
       <p:ext uri="{BB962C8B-B14F-4D97-AF65-F5344CB8AC3E}">
-        <p14:creationId xmlns:p14="http://schemas.microsoft.com/office/powerpoint/2010/main" val="1743138572"/>
+        <p14:creationId xmlns:p14="http://schemas.microsoft.com/office/powerpoint/2010/main" val="861939723"/>
       </p:ext>
     </p:extLst>
   </p:cSld>
@@ -9581,7 +9604,7 @@
           <p:cNvPr id="2" name="Title 1">
             <a:extLst>
               <a:ext uri="{FF2B5EF4-FFF2-40B4-BE49-F238E27FC236}">
-                <a16:creationId xmlns:a16="http://schemas.microsoft.com/office/drawing/2014/main" id="{FD874FE4-A80D-AA46-3F87-70C880C8888F}"/>
+                <a16:creationId xmlns:a16="http://schemas.microsoft.com/office/drawing/2014/main" id="{3E68A2FD-7BFB-2042-EEF9-4F63D57A3624}"/>
               </a:ext>
             </a:extLst>
           </p:cNvPr>
@@ -9599,7 +9622,7 @@
           <a:p>
             <a:r>
               <a:rPr lang="en-US" dirty="0"/>
-              <a:t>Methods-HTML GET over FLASK HTML</a:t>
+              <a:t>Methods-jQuery over d3.js</a:t>
             </a:r>
           </a:p>
         </p:txBody>
@@ -9609,7 +9632,7 @@
           <p:cNvPr id="3" name="Content Placeholder 2">
             <a:extLst>
               <a:ext uri="{FF2B5EF4-FFF2-40B4-BE49-F238E27FC236}">
-                <a16:creationId xmlns:a16="http://schemas.microsoft.com/office/drawing/2014/main" id="{BB1DCC51-FEC3-4D0C-5E8F-B116BF58A36B}"/>
+                <a16:creationId xmlns:a16="http://schemas.microsoft.com/office/drawing/2014/main" id="{3C1E3288-7F5F-448F-3C62-9E661D62237F}"/>
               </a:ext>
             </a:extLst>
           </p:cNvPr>
@@ -9620,45 +9643,58 @@
             <p:ph idx="1"/>
           </p:nvPr>
         </p:nvSpPr>
-        <p:spPr/>
+        <p:spPr>
+          <a:xfrm>
+            <a:off x="680321" y="2336872"/>
+            <a:ext cx="5956453" cy="4317795"/>
+          </a:xfrm>
+        </p:spPr>
         <p:txBody>
           <a:bodyPr/>
           <a:lstStyle/>
           <a:p>
             <a:r>
               <a:rPr lang="en-US" dirty="0"/>
-              <a:t>More flexibility</a:t>
+              <a:t>More specialized</a:t>
             </a:r>
           </a:p>
           <a:p>
             <a:r>
               <a:rPr lang="en-US" dirty="0"/>
-              <a:t>Fewer unique endpoints</a:t>
+              <a:t>More intuitive</a:t>
             </a:r>
           </a:p>
           <a:p>
             <a:r>
               <a:rPr lang="en-US" dirty="0"/>
-              <a:t>Less to update</a:t>
-            </a:r>
+              <a:t>1/3 the size</a:t>
+            </a:r>
+          </a:p>
+          <a:p>
+            <a:endParaRPr lang="en-US" dirty="0"/>
           </a:p>
           <a:p>
             <a:r>
               <a:rPr lang="en-US" dirty="0"/>
-              <a:t>Fewer breaking changes on updates</a:t>
-            </a:r>
-          </a:p>
-          <a:p>
-            <a:endParaRPr lang="en-US" dirty="0"/>
+              <a:t>With the use of </a:t>
+            </a:r>
+            <a:r>
+              <a:rPr lang="en-US" dirty="0" err="1"/>
+              <a:t>Plotly</a:t>
+            </a:r>
+            <a:r>
+              <a:rPr lang="en-US" dirty="0"/>
+              <a:t> and Leaflet instead of d3 for our visualizations, jQuery becomes the superior choice</a:t>
+            </a:r>
           </a:p>
         </p:txBody>
       </p:sp>
       <p:pic>
         <p:nvPicPr>
-          <p:cNvPr id="5" name="Picture 4" descr="A screenshot of a computer code&#10;&#10;Description automatically generated">
+          <p:cNvPr id="6" name="Picture 5" descr="A screenshot of a computer code&#10;&#10;Description automatically generated">
             <a:extLst>
               <a:ext uri="{FF2B5EF4-FFF2-40B4-BE49-F238E27FC236}">
-                <a16:creationId xmlns:a16="http://schemas.microsoft.com/office/drawing/2014/main" id="{EC9128C9-D9E7-ED06-064E-144A75619310}"/>
+                <a16:creationId xmlns:a16="http://schemas.microsoft.com/office/drawing/2014/main" id="{380FE2FF-CB8A-EA42-2582-44F743C60010}"/>
               </a:ext>
             </a:extLst>
           </p:cNvPr>
@@ -9675,8 +9711,8 @@
         </p:blipFill>
         <p:spPr>
           <a:xfrm>
-            <a:off x="5349978" y="4673596"/>
-            <a:ext cx="6477000" cy="1765300"/>
+            <a:off x="6651330" y="2336872"/>
+            <a:ext cx="5167671" cy="3835063"/>
           </a:xfrm>
           <a:prstGeom prst="rect">
             <a:avLst/>
@@ -9686,7 +9722,7 @@
     </p:spTree>
     <p:extLst>
       <p:ext uri="{BB962C8B-B14F-4D97-AF65-F5344CB8AC3E}">
-        <p14:creationId xmlns:p14="http://schemas.microsoft.com/office/powerpoint/2010/main" val="2219457689"/>
+        <p14:creationId xmlns:p14="http://schemas.microsoft.com/office/powerpoint/2010/main" val="1743138572"/>
       </p:ext>
     </p:extLst>
   </p:cSld>
@@ -9718,7 +9754,7 @@
           <p:cNvPr id="2" name="Title 1">
             <a:extLst>
               <a:ext uri="{FF2B5EF4-FFF2-40B4-BE49-F238E27FC236}">
-                <a16:creationId xmlns:a16="http://schemas.microsoft.com/office/drawing/2014/main" id="{7C63603A-D439-FA8F-B007-D19EB44D4C81}"/>
+                <a16:creationId xmlns:a16="http://schemas.microsoft.com/office/drawing/2014/main" id="{FD874FE4-A80D-AA46-3F87-70C880C8888F}"/>
               </a:ext>
             </a:extLst>
           </p:cNvPr>
@@ -9736,7 +9772,7 @@
           <a:p>
             <a:r>
               <a:rPr lang="en-US" dirty="0"/>
-              <a:t>Methods-Explicitly-defined ORM Classes</a:t>
+              <a:t>Methods-HTML GET over FLASK HTML</a:t>
             </a:r>
           </a:p>
         </p:txBody>
@@ -9746,7 +9782,7 @@
           <p:cNvPr id="3" name="Content Placeholder 2">
             <a:extLst>
               <a:ext uri="{FF2B5EF4-FFF2-40B4-BE49-F238E27FC236}">
-                <a16:creationId xmlns:a16="http://schemas.microsoft.com/office/drawing/2014/main" id="{ECE1D62D-296F-5312-58B9-4BF867CAE345}"/>
+                <a16:creationId xmlns:a16="http://schemas.microsoft.com/office/drawing/2014/main" id="{BB1DCC51-FEC3-4D0C-5E8F-B116BF58A36B}"/>
               </a:ext>
             </a:extLst>
           </p:cNvPr>
@@ -9764,20 +9800,29 @@
           <a:p>
             <a:r>
               <a:rPr lang="en-US" dirty="0"/>
-              <a:t>Speed</a:t>
+              <a:t>More flexibility</a:t>
             </a:r>
           </a:p>
           <a:p>
             <a:r>
               <a:rPr lang="en-US" dirty="0"/>
-              <a:t>Our datasets, our database, our knowledge</a:t>
+              <a:t>Fewer unique endpoints</a:t>
             </a:r>
           </a:p>
           <a:p>
             <a:r>
               <a:rPr lang="en-US" dirty="0"/>
-              <a:t>Modularity and readability</a:t>
-            </a:r>
+              <a:t>Less to update</a:t>
+            </a:r>
+          </a:p>
+          <a:p>
+            <a:r>
+              <a:rPr lang="en-US" dirty="0"/>
+              <a:t>Fewer breaking changes on updates</a:t>
+            </a:r>
+          </a:p>
+          <a:p>
+            <a:endParaRPr lang="en-US" dirty="0"/>
           </a:p>
         </p:txBody>
       </p:sp>
@@ -9786,7 +9831,7 @@
           <p:cNvPr id="5" name="Picture 4" descr="A screenshot of a computer code&#10;&#10;Description automatically generated">
             <a:extLst>
               <a:ext uri="{FF2B5EF4-FFF2-40B4-BE49-F238E27FC236}">
-                <a16:creationId xmlns:a16="http://schemas.microsoft.com/office/drawing/2014/main" id="{D7D6762D-BCE4-27A3-FB63-D2B1E5AAD5E9}"/>
+                <a16:creationId xmlns:a16="http://schemas.microsoft.com/office/drawing/2014/main" id="{EC9128C9-D9E7-ED06-064E-144A75619310}"/>
               </a:ext>
             </a:extLst>
           </p:cNvPr>
@@ -9803,8 +9848,8 @@
         </p:blipFill>
         <p:spPr>
           <a:xfrm>
-            <a:off x="7141647" y="2625213"/>
-            <a:ext cx="4674172" cy="3714737"/>
+            <a:off x="5349978" y="4673596"/>
+            <a:ext cx="6477000" cy="1765300"/>
           </a:xfrm>
           <a:prstGeom prst="rect">
             <a:avLst/>
@@ -9814,7 +9859,7 @@
     </p:spTree>
     <p:extLst>
       <p:ext uri="{BB962C8B-B14F-4D97-AF65-F5344CB8AC3E}">
-        <p14:creationId xmlns:p14="http://schemas.microsoft.com/office/powerpoint/2010/main" val="1045471324"/>
+        <p14:creationId xmlns:p14="http://schemas.microsoft.com/office/powerpoint/2010/main" val="2219457689"/>
       </p:ext>
     </p:extLst>
   </p:cSld>
@@ -9846,6 +9891,134 @@
           <p:cNvPr id="2" name="Title 1">
             <a:extLst>
               <a:ext uri="{FF2B5EF4-FFF2-40B4-BE49-F238E27FC236}">
+                <a16:creationId xmlns:a16="http://schemas.microsoft.com/office/drawing/2014/main" id="{7C63603A-D439-FA8F-B007-D19EB44D4C81}"/>
+              </a:ext>
+            </a:extLst>
+          </p:cNvPr>
+          <p:cNvSpPr>
+            <a:spLocks noGrp="1"/>
+          </p:cNvSpPr>
+          <p:nvPr>
+            <p:ph type="title"/>
+          </p:nvPr>
+        </p:nvSpPr>
+        <p:spPr/>
+        <p:txBody>
+          <a:bodyPr/>
+          <a:lstStyle/>
+          <a:p>
+            <a:r>
+              <a:rPr lang="en-US" dirty="0"/>
+              <a:t>Methods-Explicitly-defined ORM Classes</a:t>
+            </a:r>
+          </a:p>
+        </p:txBody>
+      </p:sp>
+      <p:sp>
+        <p:nvSpPr>
+          <p:cNvPr id="3" name="Content Placeholder 2">
+            <a:extLst>
+              <a:ext uri="{FF2B5EF4-FFF2-40B4-BE49-F238E27FC236}">
+                <a16:creationId xmlns:a16="http://schemas.microsoft.com/office/drawing/2014/main" id="{ECE1D62D-296F-5312-58B9-4BF867CAE345}"/>
+              </a:ext>
+            </a:extLst>
+          </p:cNvPr>
+          <p:cNvSpPr>
+            <a:spLocks noGrp="1"/>
+          </p:cNvSpPr>
+          <p:nvPr>
+            <p:ph idx="1"/>
+          </p:nvPr>
+        </p:nvSpPr>
+        <p:spPr/>
+        <p:txBody>
+          <a:bodyPr/>
+          <a:lstStyle/>
+          <a:p>
+            <a:r>
+              <a:rPr lang="en-US" dirty="0"/>
+              <a:t>Speed</a:t>
+            </a:r>
+          </a:p>
+          <a:p>
+            <a:r>
+              <a:rPr lang="en-US" dirty="0"/>
+              <a:t>Our datasets, our database, our knowledge</a:t>
+            </a:r>
+          </a:p>
+          <a:p>
+            <a:r>
+              <a:rPr lang="en-US" dirty="0"/>
+              <a:t>Modularity and readability</a:t>
+            </a:r>
+          </a:p>
+        </p:txBody>
+      </p:sp>
+      <p:pic>
+        <p:nvPicPr>
+          <p:cNvPr id="5" name="Picture 4" descr="A screenshot of a computer code&#10;&#10;Description automatically generated">
+            <a:extLst>
+              <a:ext uri="{FF2B5EF4-FFF2-40B4-BE49-F238E27FC236}">
+                <a16:creationId xmlns:a16="http://schemas.microsoft.com/office/drawing/2014/main" id="{D7D6762D-BCE4-27A3-FB63-D2B1E5AAD5E9}"/>
+              </a:ext>
+            </a:extLst>
+          </p:cNvPr>
+          <p:cNvPicPr>
+            <a:picLocks noChangeAspect="1"/>
+          </p:cNvPicPr>
+          <p:nvPr/>
+        </p:nvPicPr>
+        <p:blipFill>
+          <a:blip r:embed="rId3"/>
+          <a:stretch>
+            <a:fillRect/>
+          </a:stretch>
+        </p:blipFill>
+        <p:spPr>
+          <a:xfrm>
+            <a:off x="7141647" y="2625213"/>
+            <a:ext cx="4674172" cy="3714737"/>
+          </a:xfrm>
+          <a:prstGeom prst="rect">
+            <a:avLst/>
+          </a:prstGeom>
+        </p:spPr>
+      </p:pic>
+    </p:spTree>
+    <p:extLst>
+      <p:ext uri="{BB962C8B-B14F-4D97-AF65-F5344CB8AC3E}">
+        <p14:creationId xmlns:p14="http://schemas.microsoft.com/office/powerpoint/2010/main" val="1045471324"/>
+      </p:ext>
+    </p:extLst>
+  </p:cSld>
+  <p:clrMapOvr>
+    <a:masterClrMapping/>
+  </p:clrMapOvr>
+</p:sld>
+</file>
+
+<file path=ppt/slides/slide8.xml><?xml version="1.0" encoding="utf-8"?>
+<p:sld xmlns:a="http://schemas.openxmlformats.org/drawingml/2006/main" xmlns:r="http://schemas.openxmlformats.org/officeDocument/2006/relationships" xmlns:p="http://schemas.openxmlformats.org/presentationml/2006/main">
+  <p:cSld>
+    <p:spTree>
+      <p:nvGrpSpPr>
+        <p:cNvPr id="1" name=""/>
+        <p:cNvGrpSpPr/>
+        <p:nvPr/>
+      </p:nvGrpSpPr>
+      <p:grpSpPr>
+        <a:xfrm>
+          <a:off x="0" y="0"/>
+          <a:ext cx="0" cy="0"/>
+          <a:chOff x="0" y="0"/>
+          <a:chExt cx="0" cy="0"/>
+        </a:xfrm>
+      </p:grpSpPr>
+      <p:sp>
+        <p:nvSpPr>
+          <p:cNvPr id="2" name="Title 1">
+            <a:extLst>
+              <a:ext uri="{FF2B5EF4-FFF2-40B4-BE49-F238E27FC236}">
                 <a16:creationId xmlns:a16="http://schemas.microsoft.com/office/drawing/2014/main" id="{3567C01C-A97B-8618-385F-00886487EE28}"/>
               </a:ext>
             </a:extLst>
@@ -9912,7 +10085,7 @@
 </p:sld>
 </file>
 
-<file path=ppt/slides/slide8.xml><?xml version="1.0" encoding="utf-8"?>
+<file path=ppt/slides/slide9.xml><?xml version="1.0" encoding="utf-8"?>
 <p:sld xmlns:a="http://schemas.openxmlformats.org/drawingml/2006/main" xmlns:r="http://schemas.openxmlformats.org/officeDocument/2006/relationships" xmlns:p="http://schemas.openxmlformats.org/presentationml/2006/main">
   <p:cSld>
     <p:spTree>

</xml_diff>

<commit_message>
added additional method visual to pp
</commit_message>
<xml_diff>
--- a/Project-3.pptx
+++ b/Project-3.pptx
@@ -600,6 +600,115 @@
           <a:bodyPr/>
           <a:lstStyle/>
           <a:p>
+            <a:pPr marL="0" marR="0" lvl="0" indent="0" algn="l" defTabSz="914400" rtl="0" eaLnBrk="1" fontAlgn="auto" latinLnBrk="0" hangingPunct="1">
+              <a:lnSpc>
+                <a:spcPct val="100000"/>
+              </a:lnSpc>
+              <a:spcBef>
+                <a:spcPts val="0"/>
+              </a:spcBef>
+              <a:spcAft>
+                <a:spcPts val="0"/>
+              </a:spcAft>
+              <a:buClrTx/>
+              <a:buSzTx/>
+              <a:buFontTx/>
+              <a:buNone/>
+              <a:tabLst/>
+              <a:defRPr/>
+            </a:pPr>
+            <a:r>
+              <a:rPr lang="en-US" dirty="0"/>
+              <a:t>-effects everyone either directly or indirectly</a:t>
+            </a:r>
+          </a:p>
+          <a:p>
+            <a:pPr marL="0" marR="0" lvl="0" indent="0" algn="l" defTabSz="914400" rtl="0" eaLnBrk="1" fontAlgn="auto" latinLnBrk="0" hangingPunct="1">
+              <a:lnSpc>
+                <a:spcPct val="100000"/>
+              </a:lnSpc>
+              <a:spcBef>
+                <a:spcPts val="0"/>
+              </a:spcBef>
+              <a:spcAft>
+                <a:spcPts val="0"/>
+              </a:spcAft>
+              <a:buClrTx/>
+              <a:buSzTx/>
+              <a:buFontTx/>
+              <a:buNone/>
+              <a:tabLst/>
+              <a:defRPr/>
+            </a:pPr>
+            <a:endParaRPr lang="en-US" dirty="0"/>
+          </a:p>
+          <a:p>
+            <a:pPr marL="0" marR="0" lvl="0" indent="0" algn="l" defTabSz="914400" rtl="0" eaLnBrk="1" fontAlgn="auto" latinLnBrk="0" hangingPunct="1">
+              <a:lnSpc>
+                <a:spcPct val="100000"/>
+              </a:lnSpc>
+              <a:spcBef>
+                <a:spcPts val="0"/>
+              </a:spcBef>
+              <a:spcAft>
+                <a:spcPts val="0"/>
+              </a:spcAft>
+              <a:buClrTx/>
+              <a:buSzTx/>
+              <a:buFontTx/>
+              <a:buNone/>
+              <a:tabLst/>
+              <a:defRPr/>
+            </a:pPr>
+            <a:r>
+              <a:rPr lang="en-US" dirty="0"/>
+              <a:t>-property damage, environmental degradation, and even loss of life</a:t>
+            </a:r>
+          </a:p>
+          <a:p>
+            <a:pPr marL="0" marR="0" lvl="0" indent="0" algn="l" defTabSz="914400" rtl="0" eaLnBrk="1" fontAlgn="auto" latinLnBrk="0" hangingPunct="1">
+              <a:lnSpc>
+                <a:spcPct val="100000"/>
+              </a:lnSpc>
+              <a:spcBef>
+                <a:spcPts val="0"/>
+              </a:spcBef>
+              <a:spcAft>
+                <a:spcPts val="0"/>
+              </a:spcAft>
+              <a:buClrTx/>
+              <a:buSzTx/>
+              <a:buFontTx/>
+              <a:buNone/>
+              <a:tabLst/>
+              <a:defRPr/>
+            </a:pPr>
+            <a:endParaRPr lang="en-US" dirty="0"/>
+          </a:p>
+          <a:p>
+            <a:pPr marL="0" marR="0" lvl="0" indent="0" algn="l" defTabSz="914400" rtl="0" eaLnBrk="1" fontAlgn="auto" latinLnBrk="0" hangingPunct="1">
+              <a:lnSpc>
+                <a:spcPct val="100000"/>
+              </a:lnSpc>
+              <a:spcBef>
+                <a:spcPts val="0"/>
+              </a:spcBef>
+              <a:spcAft>
+                <a:spcPts val="0"/>
+              </a:spcAft>
+              <a:buClrTx/>
+              <a:buSzTx/>
+              <a:buFontTx/>
+              <a:buNone/>
+              <a:tabLst/>
+              <a:defRPr/>
+            </a:pPr>
+            <a:r>
+              <a:rPr lang="en-US" dirty="0"/>
+              <a:t>-Hopefully reducing vulnerabilities and making strides to create a safer and more resilient world</a:t>
+            </a:r>
+          </a:p>
+          <a:p>
             <a:endParaRPr lang="en-US" dirty="0"/>
           </a:p>
         </p:txBody>
@@ -621,7 +730,7 @@
           <a:p>
             <a:fld id="{97A8A3DF-6C8A-C742-B4C9-A657098D1157}" type="slidenum">
               <a:rPr lang="en-US" smtClean="0"/>
-              <a:t>3</a:t>
+              <a:t>2</a:t>
             </a:fld>
             <a:endParaRPr lang="en-US"/>
           </a:p>
@@ -630,7 +739,7 @@
     </p:spTree>
     <p:extLst>
       <p:ext uri="{BB962C8B-B14F-4D97-AF65-F5344CB8AC3E}">
-        <p14:creationId xmlns:p14="http://schemas.microsoft.com/office/powerpoint/2010/main" val="2381332251"/>
+        <p14:creationId xmlns:p14="http://schemas.microsoft.com/office/powerpoint/2010/main" val="4145642538"/>
       </p:ext>
     </p:extLst>
   </p:cSld>
@@ -705,7 +814,7 @@
           <a:p>
             <a:fld id="{97A8A3DF-6C8A-C742-B4C9-A657098D1157}" type="slidenum">
               <a:rPr lang="en-US" smtClean="0"/>
-              <a:t>4</a:t>
+              <a:t>3</a:t>
             </a:fld>
             <a:endParaRPr lang="en-US"/>
           </a:p>
@@ -714,7 +823,7 @@
     </p:spTree>
     <p:extLst>
       <p:ext uri="{BB962C8B-B14F-4D97-AF65-F5344CB8AC3E}">
-        <p14:creationId xmlns:p14="http://schemas.microsoft.com/office/powerpoint/2010/main" val="3220400219"/>
+        <p14:creationId xmlns:p14="http://schemas.microsoft.com/office/powerpoint/2010/main" val="2381332251"/>
       </p:ext>
     </p:extLst>
   </p:cSld>
@@ -768,166 +877,6 @@
           <a:bodyPr/>
           <a:lstStyle/>
           <a:p>
-            <a:r>
-              <a:rPr lang="en-US" b="0" i="0" dirty="0">
-                <a:solidFill>
-                  <a:srgbClr val="1D1C1D"/>
-                </a:solidFill>
-                <a:effectLst/>
-                <a:latin typeface="Slack-Lato"/>
-              </a:rPr>
-              <a:t>1. because jQuery is only for general </a:t>
-            </a:r>
-            <a:r>
-              <a:rPr lang="en-US" b="0" i="0" dirty="0" err="1">
-                <a:solidFill>
-                  <a:srgbClr val="1D1C1D"/>
-                </a:solidFill>
-                <a:effectLst/>
-                <a:latin typeface="Slack-Lato"/>
-              </a:rPr>
-              <a:t>dom</a:t>
-            </a:r>
-            <a:r>
-              <a:rPr lang="en-US" b="0" i="0" dirty="0">
-                <a:solidFill>
-                  <a:srgbClr val="1D1C1D"/>
-                </a:solidFill>
-                <a:effectLst/>
-                <a:latin typeface="Slack-Lato"/>
-              </a:rPr>
-              <a:t> manipulation, it's faster. we were making a web app, and so we went with a library for creating web apps</a:t>
-            </a:r>
-            <a:br>
-              <a:rPr lang="en-US" dirty="0"/>
-            </a:br>
-            <a:r>
-              <a:rPr lang="en-US" b="0" i="0" dirty="0">
-                <a:solidFill>
-                  <a:srgbClr val="1D1C1D"/>
-                </a:solidFill>
-                <a:effectLst/>
-                <a:latin typeface="Slack-Lato"/>
-              </a:rPr>
-              <a:t>2. narrower library scope means smaller size of the library - ~160 kilobytes isn't much, but you're not always going to be building for people with good internet connections</a:t>
-            </a:r>
-            <a:br>
-              <a:rPr lang="en-US" dirty="0"/>
-            </a:br>
-            <a:r>
-              <a:rPr lang="en-US" b="0" i="0" dirty="0">
-                <a:solidFill>
-                  <a:srgbClr val="1D1C1D"/>
-                </a:solidFill>
-                <a:effectLst/>
-                <a:latin typeface="Slack-Lato"/>
-              </a:rPr>
-              <a:t>3. </a:t>
-            </a:r>
-            <a:r>
-              <a:rPr lang="en-US" b="0" i="0" dirty="0" err="1">
-                <a:solidFill>
-                  <a:srgbClr val="1D1C1D"/>
-                </a:solidFill>
-                <a:effectLst/>
-                <a:latin typeface="Slack-Lato"/>
-              </a:rPr>
-              <a:t>i</a:t>
-            </a:r>
-            <a:r>
-              <a:rPr lang="en-US" b="0" i="0" dirty="0">
-                <a:solidFill>
-                  <a:srgbClr val="1D1C1D"/>
-                </a:solidFill>
-                <a:effectLst/>
-                <a:latin typeface="Slack-Lato"/>
-              </a:rPr>
-              <a:t> didn't see the point of d3 making </a:t>
-            </a:r>
-            <a:r>
-              <a:rPr lang="en-US" dirty="0"/>
-              <a:t>d3.json()</a:t>
-            </a:r>
-            <a:r>
-              <a:rPr lang="en-US" b="0" i="0" dirty="0">
-                <a:solidFill>
-                  <a:srgbClr val="1D1C1D"/>
-                </a:solidFill>
-                <a:effectLst/>
-                <a:latin typeface="Slack-Lato"/>
-              </a:rPr>
-              <a:t> return a Promise? </a:t>
-            </a:r>
-            <a:r>
-              <a:rPr lang="en-US" dirty="0"/>
-              <a:t>$.</a:t>
-            </a:r>
-            <a:r>
-              <a:rPr lang="en-US" dirty="0" err="1"/>
-              <a:t>getJSON</a:t>
-            </a:r>
-            <a:r>
-              <a:rPr lang="en-US" dirty="0"/>
-              <a:t>(</a:t>
-            </a:r>
-            <a:r>
-              <a:rPr lang="en-US" dirty="0" err="1"/>
-              <a:t>url</a:t>
-            </a:r>
-            <a:r>
-              <a:rPr lang="en-US" dirty="0"/>
-              <a:t>, function)</a:t>
-            </a:r>
-            <a:r>
-              <a:rPr lang="en-US" b="0" i="0" dirty="0">
-                <a:solidFill>
-                  <a:srgbClr val="1D1C1D"/>
-                </a:solidFill>
-                <a:effectLst/>
-                <a:latin typeface="Slack-Lato"/>
-              </a:rPr>
-              <a:t> sticks d3's "then" function directly into the </a:t>
-            </a:r>
-            <a:r>
-              <a:rPr lang="en-US" b="0" i="0" dirty="0" err="1">
-                <a:solidFill>
-                  <a:srgbClr val="1D1C1D"/>
-                </a:solidFill>
-                <a:effectLst/>
-                <a:latin typeface="Slack-Lato"/>
-              </a:rPr>
-              <a:t>url</a:t>
-            </a:r>
-            <a:r>
-              <a:rPr lang="en-US" b="0" i="0" dirty="0">
-                <a:solidFill>
-                  <a:srgbClr val="1D1C1D"/>
-                </a:solidFill>
-                <a:effectLst/>
-                <a:latin typeface="Slack-Lato"/>
-              </a:rPr>
-              <a:t> request - not only does this make more sense, but it also allows you to see this functionality directly on the same page in the </a:t>
-            </a:r>
-            <a:r>
-              <a:rPr lang="en-US" b="0" i="0" dirty="0" err="1">
-                <a:solidFill>
-                  <a:srgbClr val="1D1C1D"/>
-                </a:solidFill>
-                <a:effectLst/>
-                <a:latin typeface="Slack-Lato"/>
-              </a:rPr>
-              <a:t>jquery</a:t>
-            </a:r>
-            <a:r>
-              <a:rPr lang="en-US" b="0" i="0" dirty="0">
-                <a:solidFill>
-                  <a:srgbClr val="1D1C1D"/>
-                </a:solidFill>
-                <a:effectLst/>
-                <a:latin typeface="Slack-Lato"/>
-              </a:rPr>
-              <a:t> documentation, instead of having to be pointed to another web page for the "then" documentation</a:t>
-            </a:r>
             <a:endParaRPr lang="en-US" dirty="0"/>
           </a:p>
         </p:txBody>
@@ -949,7 +898,7 @@
           <a:p>
             <a:fld id="{97A8A3DF-6C8A-C742-B4C9-A657098D1157}" type="slidenum">
               <a:rPr lang="en-US" smtClean="0"/>
-              <a:t>5</a:t>
+              <a:t>4</a:t>
             </a:fld>
             <a:endParaRPr lang="en-US"/>
           </a:p>
@@ -958,7 +907,7 @@
     </p:spTree>
     <p:extLst>
       <p:ext uri="{BB962C8B-B14F-4D97-AF65-F5344CB8AC3E}">
-        <p14:creationId xmlns:p14="http://schemas.microsoft.com/office/powerpoint/2010/main" val="4191555918"/>
+        <p14:creationId xmlns:p14="http://schemas.microsoft.com/office/powerpoint/2010/main" val="3220400219"/>
       </p:ext>
     </p:extLst>
   </p:cSld>
@@ -1020,7 +969,7 @@
                 <a:effectLst/>
                 <a:latin typeface="Slack-Lato"/>
               </a:rPr>
-              <a:t>1. you can specify parameters as you want, in any order, by name.</a:t>
+              <a:t>1. because jQuery is only for general document object model manipulation, it's faster. we were making a web app, and so we went with a library for creating web apps</a:t>
             </a:r>
             <a:br>
               <a:rPr lang="en-US" dirty="0"/>
@@ -1033,7 +982,84 @@
                 <a:effectLst/>
                 <a:latin typeface="Slack-Lato"/>
               </a:rPr>
-              <a:t>2. you can use one endpoint for more different types of queries, based on whether or not a parameter exists in the </a:t>
+              <a:t>2. narrower library scope means smaller size of the library - ~160 kilobytes isn't much, but you're not always going to be building for people with good internet connections</a:t>
+            </a:r>
+            <a:br>
+              <a:rPr lang="en-US" dirty="0"/>
+            </a:br>
+            <a:r>
+              <a:rPr lang="en-US" b="0" i="0" dirty="0">
+                <a:solidFill>
+                  <a:srgbClr val="1D1C1D"/>
+                </a:solidFill>
+                <a:effectLst/>
+                <a:latin typeface="Slack-Lato"/>
+              </a:rPr>
+              <a:t>3. </a:t>
+            </a:r>
+            <a:r>
+              <a:rPr lang="en-US" b="0" i="0" dirty="0" err="1">
+                <a:solidFill>
+                  <a:srgbClr val="1D1C1D"/>
+                </a:solidFill>
+                <a:effectLst/>
+                <a:latin typeface="Slack-Lato"/>
+              </a:rPr>
+              <a:t>i</a:t>
+            </a:r>
+            <a:r>
+              <a:rPr lang="en-US" b="0" i="0" dirty="0">
+                <a:solidFill>
+                  <a:srgbClr val="1D1C1D"/>
+                </a:solidFill>
+                <a:effectLst/>
+                <a:latin typeface="Slack-Lato"/>
+              </a:rPr>
+              <a:t> didn't see the point of d3 making </a:t>
+            </a:r>
+            <a:r>
+              <a:rPr lang="en-US" dirty="0"/>
+              <a:t>d3.json()</a:t>
+            </a:r>
+            <a:r>
+              <a:rPr lang="en-US" b="0" i="0" dirty="0">
+                <a:solidFill>
+                  <a:srgbClr val="1D1C1D"/>
+                </a:solidFill>
+                <a:effectLst/>
+                <a:latin typeface="Slack-Lato"/>
+              </a:rPr>
+              <a:t> return a Promise? </a:t>
+            </a:r>
+            <a:r>
+              <a:rPr lang="en-US" dirty="0"/>
+              <a:t>$.</a:t>
+            </a:r>
+            <a:r>
+              <a:rPr lang="en-US" dirty="0" err="1"/>
+              <a:t>getJSON</a:t>
+            </a:r>
+            <a:r>
+              <a:rPr lang="en-US" dirty="0"/>
+              <a:t>(</a:t>
+            </a:r>
+            <a:r>
+              <a:rPr lang="en-US" dirty="0" err="1"/>
+              <a:t>url</a:t>
+            </a:r>
+            <a:r>
+              <a:rPr lang="en-US" dirty="0"/>
+              <a:t>, function)</a:t>
+            </a:r>
+            <a:r>
+              <a:rPr lang="en-US" b="0" i="0" dirty="0">
+                <a:solidFill>
+                  <a:srgbClr val="1D1C1D"/>
+                </a:solidFill>
+                <a:effectLst/>
+                <a:latin typeface="Slack-Lato"/>
+              </a:rPr>
+              <a:t> sticks d3's "then" function directly into the </a:t>
             </a:r>
             <a:r>
               <a:rPr lang="en-US" b="0" i="0" dirty="0" err="1">
@@ -1045,9 +1071,6 @@
               </a:rPr>
               <a:t>url</a:t>
             </a:r>
-            <a:br>
-              <a:rPr lang="en-US" dirty="0"/>
-            </a:br>
             <a:r>
               <a:rPr lang="en-US" b="0" i="0" dirty="0">
                 <a:solidFill>
@@ -1056,11 +1079,18 @@
                 <a:effectLst/>
                 <a:latin typeface="Slack-Lato"/>
               </a:rPr>
-              <a:t>3. adding or removing functionality to a specific query type means just changing a few lines of code, instead of: the endpoint, the function header, the code, possibly creating a new function...</a:t>
-            </a:r>
-            <a:br>
-              <a:rPr lang="en-US" dirty="0"/>
-            </a:br>
+              <a:t> request - not only does this make more sense, but it also allows you to see this functionality directly on the same page in the </a:t>
+            </a:r>
+            <a:r>
+              <a:rPr lang="en-US" b="0" i="0" dirty="0" err="1">
+                <a:solidFill>
+                  <a:srgbClr val="1D1C1D"/>
+                </a:solidFill>
+                <a:effectLst/>
+                <a:latin typeface="Slack-Lato"/>
+              </a:rPr>
+              <a:t>jquery</a:t>
+            </a:r>
             <a:r>
               <a:rPr lang="en-US" b="0" i="0" dirty="0">
                 <a:solidFill>
@@ -1069,67 +1099,7 @@
                 <a:effectLst/>
                 <a:latin typeface="Slack-Lato"/>
               </a:rPr>
-              <a:t>4. end-users (people using the </a:t>
-            </a:r>
-            <a:r>
-              <a:rPr lang="en-US" b="0" i="0" dirty="0" err="1">
-                <a:solidFill>
-                  <a:srgbClr val="1D1C1D"/>
-                </a:solidFill>
-                <a:effectLst/>
-                <a:latin typeface="Slack-Lato"/>
-              </a:rPr>
-              <a:t>api</a:t>
-            </a:r>
-            <a:r>
-              <a:rPr lang="en-US" b="0" i="0" dirty="0">
-                <a:solidFill>
-                  <a:srgbClr val="1D1C1D"/>
-                </a:solidFill>
-                <a:effectLst/>
-                <a:latin typeface="Slack-Lato"/>
-              </a:rPr>
-              <a:t> from their </a:t>
-            </a:r>
-            <a:r>
-              <a:rPr lang="en-US" b="0" i="0" dirty="0" err="1">
-                <a:solidFill>
-                  <a:srgbClr val="1D1C1D"/>
-                </a:solidFill>
-                <a:effectLst/>
-                <a:latin typeface="Slack-Lato"/>
-              </a:rPr>
-              <a:t>javascript</a:t>
-            </a:r>
-            <a:r>
-              <a:rPr lang="en-US" b="0" i="0" dirty="0">
-                <a:solidFill>
-                  <a:srgbClr val="1D1C1D"/>
-                </a:solidFill>
-                <a:effectLst/>
-                <a:latin typeface="Slack-Lato"/>
-              </a:rPr>
-              <a:t>) probably won't have to change their code to get the same results when the </a:t>
-            </a:r>
-            <a:r>
-              <a:rPr lang="en-US" b="0" i="0" dirty="0" err="1">
-                <a:solidFill>
-                  <a:srgbClr val="1D1C1D"/>
-                </a:solidFill>
-                <a:effectLst/>
-                <a:latin typeface="Slack-Lato"/>
-              </a:rPr>
-              <a:t>api</a:t>
-            </a:r>
-            <a:r>
-              <a:rPr lang="en-US" b="0" i="0" dirty="0">
-                <a:solidFill>
-                  <a:srgbClr val="1D1C1D"/>
-                </a:solidFill>
-                <a:effectLst/>
-                <a:latin typeface="Slack-Lato"/>
-              </a:rPr>
-              <a:t> is updated</a:t>
+              <a:t> documentation, instead of having to be pointed to another web page for the "then" documentation</a:t>
             </a:r>
             <a:endParaRPr lang="en-US" dirty="0"/>
           </a:p>
@@ -1152,7 +1122,7 @@
           <a:p>
             <a:fld id="{97A8A3DF-6C8A-C742-B4C9-A657098D1157}" type="slidenum">
               <a:rPr lang="en-US" smtClean="0"/>
-              <a:t>6</a:t>
+              <a:t>5</a:t>
             </a:fld>
             <a:endParaRPr lang="en-US"/>
           </a:p>
@@ -1161,7 +1131,7 @@
     </p:spTree>
     <p:extLst>
       <p:ext uri="{BB962C8B-B14F-4D97-AF65-F5344CB8AC3E}">
-        <p14:creationId xmlns:p14="http://schemas.microsoft.com/office/powerpoint/2010/main" val="2451951576"/>
+        <p14:creationId xmlns:p14="http://schemas.microsoft.com/office/powerpoint/2010/main" val="4191555918"/>
       </p:ext>
     </p:extLst>
   </p:cSld>
@@ -1223,6 +1193,209 @@
                 <a:effectLst/>
                 <a:latin typeface="Slack-Lato"/>
               </a:rPr>
+              <a:t>1. you can specify parameters as you want, in any order, by name.</a:t>
+            </a:r>
+            <a:br>
+              <a:rPr lang="en-US" dirty="0"/>
+            </a:br>
+            <a:r>
+              <a:rPr lang="en-US" b="0" i="0" dirty="0">
+                <a:solidFill>
+                  <a:srgbClr val="1D1C1D"/>
+                </a:solidFill>
+                <a:effectLst/>
+                <a:latin typeface="Slack-Lato"/>
+              </a:rPr>
+              <a:t>2. you can use one endpoint for more different types of queries, based on whether or not a parameter exists in the </a:t>
+            </a:r>
+            <a:r>
+              <a:rPr lang="en-US" b="0" i="0" dirty="0" err="1">
+                <a:solidFill>
+                  <a:srgbClr val="1D1C1D"/>
+                </a:solidFill>
+                <a:effectLst/>
+                <a:latin typeface="Slack-Lato"/>
+              </a:rPr>
+              <a:t>url</a:t>
+            </a:r>
+            <a:br>
+              <a:rPr lang="en-US" dirty="0"/>
+            </a:br>
+            <a:r>
+              <a:rPr lang="en-US" b="0" i="0" dirty="0">
+                <a:solidFill>
+                  <a:srgbClr val="1D1C1D"/>
+                </a:solidFill>
+                <a:effectLst/>
+                <a:latin typeface="Slack-Lato"/>
+              </a:rPr>
+              <a:t>3. adding or removing functionality to a specific query type means just changing a few lines of code, instead of: the endpoint, the function header, the code, possibly creating a new function...</a:t>
+            </a:r>
+            <a:br>
+              <a:rPr lang="en-US" dirty="0"/>
+            </a:br>
+            <a:r>
+              <a:rPr lang="en-US" b="0" i="0" dirty="0">
+                <a:solidFill>
+                  <a:srgbClr val="1D1C1D"/>
+                </a:solidFill>
+                <a:effectLst/>
+                <a:latin typeface="Slack-Lato"/>
+              </a:rPr>
+              <a:t>4. end-users (people using the </a:t>
+            </a:r>
+            <a:r>
+              <a:rPr lang="en-US" b="0" i="0" dirty="0" err="1">
+                <a:solidFill>
+                  <a:srgbClr val="1D1C1D"/>
+                </a:solidFill>
+                <a:effectLst/>
+                <a:latin typeface="Slack-Lato"/>
+              </a:rPr>
+              <a:t>api</a:t>
+            </a:r>
+            <a:r>
+              <a:rPr lang="en-US" b="0" i="0" dirty="0">
+                <a:solidFill>
+                  <a:srgbClr val="1D1C1D"/>
+                </a:solidFill>
+                <a:effectLst/>
+                <a:latin typeface="Slack-Lato"/>
+              </a:rPr>
+              <a:t> from their </a:t>
+            </a:r>
+            <a:r>
+              <a:rPr lang="en-US" b="0" i="0" dirty="0" err="1">
+                <a:solidFill>
+                  <a:srgbClr val="1D1C1D"/>
+                </a:solidFill>
+                <a:effectLst/>
+                <a:latin typeface="Slack-Lato"/>
+              </a:rPr>
+              <a:t>javascript</a:t>
+            </a:r>
+            <a:r>
+              <a:rPr lang="en-US" b="0" i="0" dirty="0">
+                <a:solidFill>
+                  <a:srgbClr val="1D1C1D"/>
+                </a:solidFill>
+                <a:effectLst/>
+                <a:latin typeface="Slack-Lato"/>
+              </a:rPr>
+              <a:t>) probably won't have to change their code to get the same results when the </a:t>
+            </a:r>
+            <a:r>
+              <a:rPr lang="en-US" b="0" i="0" dirty="0" err="1">
+                <a:solidFill>
+                  <a:srgbClr val="1D1C1D"/>
+                </a:solidFill>
+                <a:effectLst/>
+                <a:latin typeface="Slack-Lato"/>
+              </a:rPr>
+              <a:t>api</a:t>
+            </a:r>
+            <a:r>
+              <a:rPr lang="en-US" b="0" i="0" dirty="0">
+                <a:solidFill>
+                  <a:srgbClr val="1D1C1D"/>
+                </a:solidFill>
+                <a:effectLst/>
+                <a:latin typeface="Slack-Lato"/>
+              </a:rPr>
+              <a:t> is updated</a:t>
+            </a:r>
+            <a:endParaRPr lang="en-US" dirty="0"/>
+          </a:p>
+        </p:txBody>
+      </p:sp>
+      <p:sp>
+        <p:nvSpPr>
+          <p:cNvPr id="4" name="Slide Number Placeholder 3"/>
+          <p:cNvSpPr>
+            <a:spLocks noGrp="1"/>
+          </p:cNvSpPr>
+          <p:nvPr>
+            <p:ph type="sldNum" sz="quarter" idx="5"/>
+          </p:nvPr>
+        </p:nvSpPr>
+        <p:spPr/>
+        <p:txBody>
+          <a:bodyPr/>
+          <a:lstStyle/>
+          <a:p>
+            <a:fld id="{97A8A3DF-6C8A-C742-B4C9-A657098D1157}" type="slidenum">
+              <a:rPr lang="en-US" smtClean="0"/>
+              <a:t>6</a:t>
+            </a:fld>
+            <a:endParaRPr lang="en-US"/>
+          </a:p>
+        </p:txBody>
+      </p:sp>
+    </p:spTree>
+    <p:extLst>
+      <p:ext uri="{BB962C8B-B14F-4D97-AF65-F5344CB8AC3E}">
+        <p14:creationId xmlns:p14="http://schemas.microsoft.com/office/powerpoint/2010/main" val="2451951576"/>
+      </p:ext>
+    </p:extLst>
+  </p:cSld>
+  <p:clrMapOvr>
+    <a:masterClrMapping/>
+  </p:clrMapOvr>
+</p:notes>
+</file>
+
+<file path=ppt/notesSlides/notesSlide7.xml><?xml version="1.0" encoding="utf-8"?>
+<p:notes xmlns:a="http://schemas.openxmlformats.org/drawingml/2006/main" xmlns:r="http://schemas.openxmlformats.org/officeDocument/2006/relationships" xmlns:p="http://schemas.openxmlformats.org/presentationml/2006/main">
+  <p:cSld>
+    <p:spTree>
+      <p:nvGrpSpPr>
+        <p:cNvPr id="1" name=""/>
+        <p:cNvGrpSpPr/>
+        <p:nvPr/>
+      </p:nvGrpSpPr>
+      <p:grpSpPr>
+        <a:xfrm>
+          <a:off x="0" y="0"/>
+          <a:ext cx="0" cy="0"/>
+          <a:chOff x="0" y="0"/>
+          <a:chExt cx="0" cy="0"/>
+        </a:xfrm>
+      </p:grpSpPr>
+      <p:sp>
+        <p:nvSpPr>
+          <p:cNvPr id="2" name="Slide Image Placeholder 1"/>
+          <p:cNvSpPr>
+            <a:spLocks noGrp="1" noRot="1" noChangeAspect="1"/>
+          </p:cNvSpPr>
+          <p:nvPr>
+            <p:ph type="sldImg"/>
+          </p:nvPr>
+        </p:nvSpPr>
+        <p:spPr/>
+      </p:sp>
+      <p:sp>
+        <p:nvSpPr>
+          <p:cNvPr id="3" name="Notes Placeholder 2"/>
+          <p:cNvSpPr>
+            <a:spLocks noGrp="1"/>
+          </p:cNvSpPr>
+          <p:nvPr>
+            <p:ph type="body" idx="1"/>
+          </p:nvPr>
+        </p:nvSpPr>
+        <p:spPr/>
+        <p:txBody>
+          <a:bodyPr/>
+          <a:lstStyle/>
+          <a:p>
+            <a:r>
+              <a:rPr lang="en-US" b="0" i="0" dirty="0">
+                <a:solidFill>
+                  <a:srgbClr val="1D1C1D"/>
+                </a:solidFill>
+                <a:effectLst/>
+                <a:latin typeface="Slack-Lato"/>
+              </a:rPr>
               <a:t>1. the database needs to be opened, read from, and closed each time a query is made. using reflection for this would be needlessly slow, having to analyze the database every call, because... (of point 2)</a:t>
             </a:r>
             <a:br>
@@ -1325,7 +1498,7 @@
 </p:notes>
 </file>
 
-<file path=ppt/notesSlides/notesSlide7.xml><?xml version="1.0" encoding="utf-8"?>
+<file path=ppt/notesSlides/notesSlide8.xml><?xml version="1.0" encoding="utf-8"?>
 <p:notes xmlns:a="http://schemas.openxmlformats.org/drawingml/2006/main" xmlns:r="http://schemas.openxmlformats.org/officeDocument/2006/relationships" xmlns:p="http://schemas.openxmlformats.org/presentationml/2006/main">
   <p:cSld>
     <p:spTree>
@@ -9167,13 +9340,13 @@
             </a:r>
             <a:r>
               <a:rPr lang="en-US" dirty="0"/>
-              <a:t>, are events that can result in devastating consequences, including property damage, environmental degradation, and even loss of life</a:t>
+              <a:t>, are events that can result in devastating consequences</a:t>
             </a:r>
           </a:p>
           <a:p>
             <a:r>
               <a:rPr lang="en-US" dirty="0"/>
-              <a:t>By evaluating the data correlating to the trends of these global events, we can mitigate and prepare to reduce overall impact. Hopefully reducing vulnerabilities and making strides to create a safer and more resilient world</a:t>
+              <a:t>By evaluating the data correlating to the trends of these global events, we can mitigate and prepare to reduce the overall impact</a:t>
             </a:r>
           </a:p>
         </p:txBody>
@@ -9193,10 +9366,10 @@
           <p:nvPr/>
         </p:nvPicPr>
         <p:blipFill>
-          <a:blip r:embed="rId2">
+          <a:blip r:embed="rId3">
             <a:extLst>
               <a:ext uri="{837473B0-CC2E-450A-ABE3-18F120FF3D39}">
-                <a1611:picAttrSrcUrl xmlns:a1611="http://schemas.microsoft.com/office/drawing/2016/11/main" r:id="rId3"/>
+                <a1611:picAttrSrcUrl xmlns:a1611="http://schemas.microsoft.com/office/drawing/2016/11/main" r:id="rId4"/>
               </a:ext>
             </a:extLst>
           </a:blip>
@@ -9244,7 +9417,7 @@
           <a:p>
             <a:r>
               <a:rPr lang="en-US" sz="900" dirty="0">
-                <a:hlinkClick r:id="rId3" tooltip="https://www.ufo-spain.com/2017/12/31/top-10-noticias-mas-virales-de-este-2017/90-percent-of-worldwide-natural-disasters-are-caused-by-weather/"/>
+                <a:hlinkClick r:id="rId4" tooltip="https://www.ufo-spain.com/2017/12/31/top-10-noticias-mas-virales-de-este-2017/90-percent-of-worldwide-natural-disasters-are-caused-by-weather/"/>
               </a:rPr>
               <a:t>This Photo</a:t>
             </a:r>
@@ -9254,7 +9427,7 @@
             </a:r>
             <a:r>
               <a:rPr lang="en-US" sz="900" dirty="0">
-                <a:hlinkClick r:id="rId4" tooltip="https://creativecommons.org/licenses/by/3.0/"/>
+                <a:hlinkClick r:id="rId5" tooltip="https://creativecommons.org/licenses/by/3.0/"/>
               </a:rPr>
               <a:t>CC BY</a:t>
             </a:r>
@@ -9541,10 +9714,10 @@
       </p:sp>
       <p:pic>
         <p:nvPicPr>
-          <p:cNvPr id="4" name="Picture 3">
+          <p:cNvPr id="5" name="Picture 4">
             <a:extLst>
               <a:ext uri="{FF2B5EF4-FFF2-40B4-BE49-F238E27FC236}">
-                <a16:creationId xmlns:a16="http://schemas.microsoft.com/office/drawing/2014/main" id="{BA445082-169A-BB47-DA15-88E017EE425C}"/>
+                <a16:creationId xmlns:a16="http://schemas.microsoft.com/office/drawing/2014/main" id="{2088F8F8-52BB-0A95-2694-F75DBA5E8B95}"/>
               </a:ext>
             </a:extLst>
           </p:cNvPr>
@@ -9561,8 +9734,8 @@
         </p:blipFill>
         <p:spPr>
           <a:xfrm>
-            <a:off x="1692491" y="2118287"/>
-            <a:ext cx="8431636" cy="4511113"/>
+            <a:off x="2317757" y="2103121"/>
+            <a:ext cx="6926578" cy="4617719"/>
           </a:xfrm>
           <a:prstGeom prst="rect">
             <a:avLst/>

</xml_diff>